<commit_message>
added midterm to slides
</commit_message>
<xml_diff>
--- a/lecture04.visualization/lecture04.db.viz.pptx
+++ b/lecture04.visualization/lecture04.db.viz.pptx
@@ -7,17 +7,23 @@
   <p:sldIdLst>
     <p:sldId id="256" r:id="rId2"/>
     <p:sldId id="257" r:id="rId3"/>
-    <p:sldId id="258" r:id="rId4"/>
-    <p:sldId id="259" r:id="rId5"/>
-    <p:sldId id="261" r:id="rId6"/>
-    <p:sldId id="262" r:id="rId7"/>
-    <p:sldId id="263" r:id="rId8"/>
-    <p:sldId id="264" r:id="rId9"/>
-    <p:sldId id="265" r:id="rId10"/>
-    <p:sldId id="266" r:id="rId11"/>
-    <p:sldId id="267" r:id="rId12"/>
-    <p:sldId id="269" r:id="rId13"/>
-    <p:sldId id="268" r:id="rId14"/>
+    <p:sldId id="259" r:id="rId4"/>
+    <p:sldId id="261" r:id="rId5"/>
+    <p:sldId id="262" r:id="rId6"/>
+    <p:sldId id="263" r:id="rId7"/>
+    <p:sldId id="264" r:id="rId8"/>
+    <p:sldId id="265" r:id="rId9"/>
+    <p:sldId id="266" r:id="rId10"/>
+    <p:sldId id="276" r:id="rId11"/>
+    <p:sldId id="275" r:id="rId12"/>
+    <p:sldId id="270" r:id="rId13"/>
+    <p:sldId id="271" r:id="rId14"/>
+    <p:sldId id="272" r:id="rId15"/>
+    <p:sldId id="273" r:id="rId16"/>
+    <p:sldId id="274" r:id="rId17"/>
+    <p:sldId id="267" r:id="rId18"/>
+    <p:sldId id="269" r:id="rId19"/>
+    <p:sldId id="268" r:id="rId20"/>
   </p:sldIdLst>
   <p:sldSz cx="12192000" cy="6858000"/>
   <p:notesSz cx="6858000" cy="9144000"/>
@@ -3044,6 +3050,13 @@
   <p:clrMapOvr>
     <a:masterClrMapping/>
   </p:clrMapOvr>
+  <p:timing>
+    <p:tnLst>
+      <p:par>
+        <p:cTn id="1" dur="indefinite" restart="never" nodeType="tmRoot"/>
+      </p:par>
+    </p:tnLst>
+  </p:timing>
 </p:sld>
 </file>
 
@@ -3081,7 +3094,7 @@
           <a:p>
             <a:r>
               <a:rPr lang="en-US" dirty="0" smtClean="0"/>
-              <a:t>Agenda</a:t>
+              <a:t>Midterm – 2 parts</a:t>
             </a:r>
             <a:endParaRPr lang="en-US" dirty="0"/>
           </a:p>
@@ -3104,29 +3117,69 @@
           <a:p>
             <a:r>
               <a:rPr lang="en-US" dirty="0" smtClean="0"/>
-              <a:t>Databases</a:t>
-            </a:r>
-          </a:p>
-          <a:p>
-            <a:r>
-              <a:rPr lang="en-US" b="1" dirty="0" err="1" smtClean="0"/>
-              <a:t>Matplotlib</a:t>
-            </a:r>
-            <a:endParaRPr lang="en-US" b="1" dirty="0" smtClean="0"/>
+              <a:t>In-class (20 questions, 1 hour)</a:t>
+            </a:r>
           </a:p>
           <a:p>
             <a:r>
               <a:rPr lang="en-US" dirty="0" smtClean="0"/>
-              <a:t>Tableau</a:t>
-            </a:r>
-            <a:endParaRPr lang="en-US" dirty="0"/>
-          </a:p>
-        </p:txBody>
-      </p:sp>
+              <a:t>Take-home (1 dataset)</a:t>
+            </a:r>
+            <a:br>
+              <a:rPr lang="en-US" dirty="0" smtClean="0"/>
+            </a:br>
+            <a:r>
+              <a:rPr lang="en-US" dirty="0" smtClean="0"/>
+              <a:t/>
+            </a:r>
+            <a:br>
+              <a:rPr lang="en-US" dirty="0" smtClean="0"/>
+            </a:br>
+            <a:r>
+              <a:rPr lang="en-US" dirty="0" smtClean="0"/>
+              <a:t/>
+            </a:r>
+            <a:br>
+              <a:rPr lang="en-US" dirty="0" smtClean="0"/>
+            </a:br>
+            <a:endParaRPr lang="en-US" dirty="0" smtClean="0"/>
+          </a:p>
+        </p:txBody>
+      </p:sp>
+      <p:pic>
+        <p:nvPicPr>
+          <p:cNvPr id="4" name="Picture 3"/>
+          <p:cNvPicPr>
+            <a:picLocks noChangeAspect="1"/>
+          </p:cNvPicPr>
+          <p:nvPr/>
+        </p:nvPicPr>
+        <p:blipFill>
+          <a:blip r:embed="rId2">
+            <a:extLst>
+              <a:ext uri="{28A0092B-C50C-407E-A947-70E740481C1C}">
+                <a14:useLocalDpi xmlns:a14="http://schemas.microsoft.com/office/drawing/2010/main" val="0"/>
+              </a:ext>
+            </a:extLst>
+          </a:blip>
+          <a:stretch>
+            <a:fillRect/>
+          </a:stretch>
+        </p:blipFill>
+        <p:spPr>
+          <a:xfrm>
+            <a:off x="2184400" y="3016250"/>
+            <a:ext cx="7823200" cy="2755900"/>
+          </a:xfrm>
+          <a:prstGeom prst="rect">
+            <a:avLst/>
+          </a:prstGeom>
+        </p:spPr>
+      </p:pic>
     </p:spTree>
     <p:extLst>
       <p:ext uri="{BB962C8B-B14F-4D97-AF65-F5344CB8AC3E}">
-        <p14:creationId xmlns:p14="http://schemas.microsoft.com/office/powerpoint/2010/main" val="914395436"/>
+        <p14:creationId xmlns:p14="http://schemas.microsoft.com/office/powerpoint/2010/main" val="1177846263"/>
       </p:ext>
     </p:extLst>
   </p:cSld>
@@ -3205,6 +3258,651 @@
           </a:p>
           <a:p>
             <a:r>
+              <a:rPr lang="en-US" smtClean="0"/>
+              <a:t>Midterm</a:t>
+            </a:r>
+            <a:endParaRPr lang="en-US" dirty="0" smtClean="0"/>
+          </a:p>
+          <a:p>
+            <a:r>
+              <a:rPr lang="en-US" b="1" dirty="0" err="1" smtClean="0"/>
+              <a:t>Matplotlib</a:t>
+            </a:r>
+            <a:endParaRPr lang="en-US" b="1" dirty="0" smtClean="0"/>
+          </a:p>
+          <a:p>
+            <a:r>
+              <a:rPr lang="en-US" dirty="0" smtClean="0"/>
+              <a:t>Tableau</a:t>
+            </a:r>
+            <a:endParaRPr lang="en-US" dirty="0"/>
+          </a:p>
+        </p:txBody>
+      </p:sp>
+    </p:spTree>
+    <p:extLst>
+      <p:ext uri="{BB962C8B-B14F-4D97-AF65-F5344CB8AC3E}">
+        <p14:creationId xmlns:p14="http://schemas.microsoft.com/office/powerpoint/2010/main" val="2127994853"/>
+      </p:ext>
+    </p:extLst>
+  </p:cSld>
+  <p:clrMapOvr>
+    <a:masterClrMapping/>
+  </p:clrMapOvr>
+  <p:timing>
+    <p:tnLst>
+      <p:par>
+        <p:cTn id="1" dur="indefinite" restart="never" nodeType="tmRoot"/>
+      </p:par>
+    </p:tnLst>
+  </p:timing>
+</p:sld>
+</file>
+
+<file path=ppt/slides/slide12.xml><?xml version="1.0" encoding="utf-8"?>
+<p:sld xmlns:a="http://schemas.openxmlformats.org/drawingml/2006/main" xmlns:r="http://schemas.openxmlformats.org/officeDocument/2006/relationships" xmlns:p="http://schemas.openxmlformats.org/presentationml/2006/main">
+  <p:cSld>
+    <p:spTree>
+      <p:nvGrpSpPr>
+        <p:cNvPr id="1" name=""/>
+        <p:cNvGrpSpPr/>
+        <p:nvPr/>
+      </p:nvGrpSpPr>
+      <p:grpSpPr>
+        <a:xfrm>
+          <a:off x="0" y="0"/>
+          <a:ext cx="0" cy="0"/>
+          <a:chOff x="0" y="0"/>
+          <a:chExt cx="0" cy="0"/>
+        </a:xfrm>
+      </p:grpSpPr>
+      <p:sp>
+        <p:nvSpPr>
+          <p:cNvPr id="2" name="Title 1"/>
+          <p:cNvSpPr>
+            <a:spLocks noGrp="1"/>
+          </p:cNvSpPr>
+          <p:nvPr>
+            <p:ph type="title"/>
+          </p:nvPr>
+        </p:nvSpPr>
+        <p:spPr/>
+        <p:txBody>
+          <a:bodyPr/>
+          <a:lstStyle/>
+          <a:p>
+            <a:r>
+              <a:rPr lang="en-US" dirty="0" err="1" smtClean="0"/>
+              <a:t>Matplotlib</a:t>
+            </a:r>
+            <a:r>
+              <a:rPr lang="en-US" dirty="0" smtClean="0"/>
+              <a:t>	</a:t>
+            </a:r>
+            <a:endParaRPr lang="en-US" dirty="0"/>
+          </a:p>
+        </p:txBody>
+      </p:sp>
+      <p:sp>
+        <p:nvSpPr>
+          <p:cNvPr id="3" name="Content Placeholder 2"/>
+          <p:cNvSpPr>
+            <a:spLocks noGrp="1"/>
+          </p:cNvSpPr>
+          <p:nvPr>
+            <p:ph idx="1"/>
+          </p:nvPr>
+        </p:nvSpPr>
+        <p:spPr/>
+        <p:txBody>
+          <a:bodyPr/>
+          <a:lstStyle/>
+          <a:p>
+            <a:r>
+              <a:rPr lang="en-US" altLang="zh-TW" b="1" dirty="0" err="1" smtClean="0"/>
+              <a:t>Matplotlib</a:t>
+            </a:r>
+            <a:r>
+              <a:rPr lang="en-US" altLang="zh-TW" dirty="0" smtClean="0"/>
+              <a:t> is a python 2D plotting library which produces publication quality figures in a variety of hardcopy formats and interactive environments across platforms.</a:t>
+            </a:r>
+          </a:p>
+          <a:p>
+            <a:r>
+              <a:rPr lang="en-US" altLang="zh-TW" b="1" dirty="0" err="1" smtClean="0"/>
+              <a:t>Matplotlib</a:t>
+            </a:r>
+            <a:r>
+              <a:rPr lang="en-US" altLang="zh-TW" dirty="0" smtClean="0"/>
+              <a:t> is the whole package; </a:t>
+            </a:r>
+            <a:r>
+              <a:rPr lang="en-US" altLang="zh-TW" b="1" dirty="0" err="1" smtClean="0"/>
+              <a:t>pylab</a:t>
+            </a:r>
+            <a:r>
+              <a:rPr lang="en-US" altLang="zh-TW" dirty="0" smtClean="0"/>
+              <a:t> is a module in </a:t>
+            </a:r>
+            <a:r>
+              <a:rPr lang="en-US" altLang="zh-TW" dirty="0" err="1" smtClean="0"/>
+              <a:t>matplotlib</a:t>
+            </a:r>
+            <a:r>
+              <a:rPr lang="en-US" altLang="zh-TW" dirty="0" smtClean="0"/>
+              <a:t> that gets installed alongside </a:t>
+            </a:r>
+            <a:r>
+              <a:rPr lang="en-US" altLang="zh-TW" dirty="0" err="1" smtClean="0"/>
+              <a:t>matplotlib</a:t>
+            </a:r>
+            <a:r>
+              <a:rPr lang="en-US" altLang="zh-TW" dirty="0" smtClean="0"/>
+              <a:t>; and </a:t>
+            </a:r>
+            <a:r>
+              <a:rPr lang="en-US" altLang="zh-TW" b="1" dirty="0" err="1" smtClean="0"/>
+              <a:t>matplotlib.pyplot</a:t>
+            </a:r>
+            <a:r>
+              <a:rPr lang="en-US" altLang="zh-TW" dirty="0" smtClean="0"/>
+              <a:t> is a module in </a:t>
+            </a:r>
+            <a:r>
+              <a:rPr lang="en-US" altLang="zh-TW" dirty="0" err="1" smtClean="0"/>
+              <a:t>matplotlib</a:t>
+            </a:r>
+            <a:endParaRPr lang="en-US" altLang="zh-TW" dirty="0" smtClean="0"/>
+          </a:p>
+          <a:p>
+            <a:r>
+              <a:rPr lang="en-US" altLang="zh-TW" b="1" dirty="0" err="1" smtClean="0"/>
+              <a:t>Pyplot</a:t>
+            </a:r>
+            <a:r>
+              <a:rPr lang="en-US" altLang="zh-TW" dirty="0" smtClean="0"/>
+              <a:t> provides the state-machine interface to the underlying plotting library in </a:t>
+            </a:r>
+            <a:r>
+              <a:rPr lang="en-US" altLang="zh-TW" dirty="0" err="1" smtClean="0"/>
+              <a:t>matplotlib</a:t>
+            </a:r>
+            <a:r>
+              <a:rPr lang="en-US" altLang="zh-TW" dirty="0" smtClean="0"/>
+              <a:t>. </a:t>
+            </a:r>
+          </a:p>
+        </p:txBody>
+      </p:sp>
+    </p:spTree>
+    <p:extLst>
+      <p:ext uri="{BB962C8B-B14F-4D97-AF65-F5344CB8AC3E}">
+        <p14:creationId xmlns:p14="http://schemas.microsoft.com/office/powerpoint/2010/main" val="591825258"/>
+      </p:ext>
+    </p:extLst>
+  </p:cSld>
+  <p:clrMapOvr>
+    <a:masterClrMapping/>
+  </p:clrMapOvr>
+  <p:timing>
+    <p:tnLst>
+      <p:par>
+        <p:cTn id="1" dur="indefinite" restart="never" nodeType="tmRoot"/>
+      </p:par>
+    </p:tnLst>
+  </p:timing>
+</p:sld>
+</file>
+
+<file path=ppt/slides/slide13.xml><?xml version="1.0" encoding="utf-8"?>
+<p:sld xmlns:a="http://schemas.openxmlformats.org/drawingml/2006/main" xmlns:r="http://schemas.openxmlformats.org/officeDocument/2006/relationships" xmlns:p="http://schemas.openxmlformats.org/presentationml/2006/main">
+  <p:cSld>
+    <p:spTree>
+      <p:nvGrpSpPr>
+        <p:cNvPr id="1" name=""/>
+        <p:cNvGrpSpPr/>
+        <p:nvPr/>
+      </p:nvGrpSpPr>
+      <p:grpSpPr>
+        <a:xfrm>
+          <a:off x="0" y="0"/>
+          <a:ext cx="0" cy="0"/>
+          <a:chOff x="0" y="0"/>
+          <a:chExt cx="0" cy="0"/>
+        </a:xfrm>
+      </p:grpSpPr>
+      <p:sp>
+        <p:nvSpPr>
+          <p:cNvPr id="2" name="Title 1"/>
+          <p:cNvSpPr>
+            <a:spLocks noGrp="1"/>
+          </p:cNvSpPr>
+          <p:nvPr>
+            <p:ph type="title"/>
+          </p:nvPr>
+        </p:nvSpPr>
+        <p:spPr/>
+        <p:txBody>
+          <a:bodyPr/>
+          <a:lstStyle/>
+          <a:p>
+            <a:r>
+              <a:rPr lang="en-US" dirty="0" smtClean="0"/>
+              <a:t>Subplot</a:t>
+            </a:r>
+            <a:endParaRPr lang="en-US" dirty="0"/>
+          </a:p>
+        </p:txBody>
+      </p:sp>
+      <p:sp>
+        <p:nvSpPr>
+          <p:cNvPr id="3" name="Content Placeholder 2"/>
+          <p:cNvSpPr>
+            <a:spLocks noGrp="1"/>
+          </p:cNvSpPr>
+          <p:nvPr>
+            <p:ph idx="1"/>
+          </p:nvPr>
+        </p:nvSpPr>
+        <p:spPr/>
+        <p:txBody>
+          <a:bodyPr/>
+          <a:lstStyle/>
+          <a:p>
+            <a:r>
+              <a:rPr lang="en-US" dirty="0" smtClean="0"/>
+              <a:t>Subplot divides the current figure into rectangular panes that are numbered row wise.</a:t>
+            </a:r>
+          </a:p>
+          <a:p>
+            <a:r>
+              <a:rPr lang="en-US" dirty="0" smtClean="0"/>
+              <a:t>Each pane contains an axes object. Subsequent plots are output to the current pane.</a:t>
+            </a:r>
+          </a:p>
+        </p:txBody>
+      </p:sp>
+    </p:spTree>
+    <p:extLst>
+      <p:ext uri="{BB962C8B-B14F-4D97-AF65-F5344CB8AC3E}">
+        <p14:creationId xmlns:p14="http://schemas.microsoft.com/office/powerpoint/2010/main" val="921372583"/>
+      </p:ext>
+    </p:extLst>
+  </p:cSld>
+  <p:clrMapOvr>
+    <a:masterClrMapping/>
+  </p:clrMapOvr>
+  <p:timing>
+    <p:tnLst>
+      <p:par>
+        <p:cTn id="1" dur="indefinite" restart="never" nodeType="tmRoot"/>
+      </p:par>
+    </p:tnLst>
+  </p:timing>
+</p:sld>
+</file>
+
+<file path=ppt/slides/slide14.xml><?xml version="1.0" encoding="utf-8"?>
+<p:sld xmlns:a="http://schemas.openxmlformats.org/drawingml/2006/main" xmlns:r="http://schemas.openxmlformats.org/officeDocument/2006/relationships" xmlns:p="http://schemas.openxmlformats.org/presentationml/2006/main">
+  <p:cSld>
+    <p:spTree>
+      <p:nvGrpSpPr>
+        <p:cNvPr id="1" name=""/>
+        <p:cNvGrpSpPr/>
+        <p:nvPr/>
+      </p:nvGrpSpPr>
+      <p:grpSpPr>
+        <a:xfrm>
+          <a:off x="0" y="0"/>
+          <a:ext cx="0" cy="0"/>
+          <a:chOff x="0" y="0"/>
+          <a:chExt cx="0" cy="0"/>
+        </a:xfrm>
+      </p:grpSpPr>
+      <p:sp>
+        <p:nvSpPr>
+          <p:cNvPr id="2" name="Title 1"/>
+          <p:cNvSpPr>
+            <a:spLocks noGrp="1"/>
+          </p:cNvSpPr>
+          <p:nvPr>
+            <p:ph type="title"/>
+          </p:nvPr>
+        </p:nvSpPr>
+        <p:spPr/>
+        <p:txBody>
+          <a:bodyPr/>
+          <a:lstStyle/>
+          <a:p>
+            <a:r>
+              <a:rPr lang="en-US" dirty="0" smtClean="0"/>
+              <a:t>Subplot grid 2X1</a:t>
+            </a:r>
+            <a:endParaRPr lang="en-US" dirty="0"/>
+          </a:p>
+        </p:txBody>
+      </p:sp>
+      <p:pic>
+        <p:nvPicPr>
+          <p:cNvPr id="4" name="Content Placeholder 3"/>
+          <p:cNvPicPr>
+            <a:picLocks noGrp="1" noChangeAspect="1"/>
+          </p:cNvPicPr>
+          <p:nvPr>
+            <p:ph idx="1"/>
+          </p:nvPr>
+        </p:nvPicPr>
+        <p:blipFill>
+          <a:blip r:embed="rId2">
+            <a:extLst>
+              <a:ext uri="{28A0092B-C50C-407E-A947-70E740481C1C}">
+                <a14:useLocalDpi xmlns:a14="http://schemas.microsoft.com/office/drawing/2010/main" val="0"/>
+              </a:ext>
+            </a:extLst>
+          </a:blip>
+          <a:stretch>
+            <a:fillRect/>
+          </a:stretch>
+        </p:blipFill>
+        <p:spPr>
+          <a:xfrm>
+            <a:off x="3188391" y="2052638"/>
+            <a:ext cx="4776993" cy="4195762"/>
+          </a:xfrm>
+        </p:spPr>
+      </p:pic>
+    </p:spTree>
+    <p:extLst>
+      <p:ext uri="{BB962C8B-B14F-4D97-AF65-F5344CB8AC3E}">
+        <p14:creationId xmlns:p14="http://schemas.microsoft.com/office/powerpoint/2010/main" val="785926133"/>
+      </p:ext>
+    </p:extLst>
+  </p:cSld>
+  <p:clrMapOvr>
+    <a:masterClrMapping/>
+  </p:clrMapOvr>
+  <p:timing>
+    <p:tnLst>
+      <p:par>
+        <p:cTn id="1" dur="indefinite" restart="never" nodeType="tmRoot"/>
+      </p:par>
+    </p:tnLst>
+  </p:timing>
+</p:sld>
+</file>
+
+<file path=ppt/slides/slide15.xml><?xml version="1.0" encoding="utf-8"?>
+<p:sld xmlns:a="http://schemas.openxmlformats.org/drawingml/2006/main" xmlns:r="http://schemas.openxmlformats.org/officeDocument/2006/relationships" xmlns:p="http://schemas.openxmlformats.org/presentationml/2006/main">
+  <p:cSld>
+    <p:spTree>
+      <p:nvGrpSpPr>
+        <p:cNvPr id="1" name=""/>
+        <p:cNvGrpSpPr/>
+        <p:nvPr/>
+      </p:nvGrpSpPr>
+      <p:grpSpPr>
+        <a:xfrm>
+          <a:off x="0" y="0"/>
+          <a:ext cx="0" cy="0"/>
+          <a:chOff x="0" y="0"/>
+          <a:chExt cx="0" cy="0"/>
+        </a:xfrm>
+      </p:grpSpPr>
+      <p:sp>
+        <p:nvSpPr>
+          <p:cNvPr id="2" name="Title 1"/>
+          <p:cNvSpPr>
+            <a:spLocks noGrp="1"/>
+          </p:cNvSpPr>
+          <p:nvPr>
+            <p:ph type="title"/>
+          </p:nvPr>
+        </p:nvSpPr>
+        <p:spPr/>
+        <p:txBody>
+          <a:bodyPr/>
+          <a:lstStyle/>
+          <a:p>
+            <a:r>
+              <a:rPr lang="en-US" smtClean="0"/>
+              <a:t>Subplot grid 2x2</a:t>
+            </a:r>
+            <a:endParaRPr lang="en-US"/>
+          </a:p>
+        </p:txBody>
+      </p:sp>
+      <p:pic>
+        <p:nvPicPr>
+          <p:cNvPr id="4" name="Content Placeholder 3"/>
+          <p:cNvPicPr>
+            <a:picLocks noGrp="1" noChangeAspect="1"/>
+          </p:cNvPicPr>
+          <p:nvPr>
+            <p:ph idx="1"/>
+          </p:nvPr>
+        </p:nvPicPr>
+        <p:blipFill>
+          <a:blip r:embed="rId2">
+            <a:extLst>
+              <a:ext uri="{28A0092B-C50C-407E-A947-70E740481C1C}">
+                <a14:useLocalDpi xmlns:a14="http://schemas.microsoft.com/office/drawing/2010/main" val="0"/>
+              </a:ext>
+            </a:extLst>
+          </a:blip>
+          <a:stretch>
+            <a:fillRect/>
+          </a:stretch>
+        </p:blipFill>
+        <p:spPr>
+          <a:xfrm>
+            <a:off x="3192932" y="2052638"/>
+            <a:ext cx="4767911" cy="4195762"/>
+          </a:xfrm>
+        </p:spPr>
+      </p:pic>
+    </p:spTree>
+    <p:extLst>
+      <p:ext uri="{BB962C8B-B14F-4D97-AF65-F5344CB8AC3E}">
+        <p14:creationId xmlns:p14="http://schemas.microsoft.com/office/powerpoint/2010/main" val="2072012497"/>
+      </p:ext>
+    </p:extLst>
+  </p:cSld>
+  <p:clrMapOvr>
+    <a:masterClrMapping/>
+  </p:clrMapOvr>
+  <p:timing>
+    <p:tnLst>
+      <p:par>
+        <p:cTn id="1" dur="indefinite" restart="never" nodeType="tmRoot"/>
+      </p:par>
+    </p:tnLst>
+  </p:timing>
+</p:sld>
+</file>
+
+<file path=ppt/slides/slide16.xml><?xml version="1.0" encoding="utf-8"?>
+<p:sld xmlns:a="http://schemas.openxmlformats.org/drawingml/2006/main" xmlns:r="http://schemas.openxmlformats.org/officeDocument/2006/relationships" xmlns:p="http://schemas.openxmlformats.org/presentationml/2006/main">
+  <p:cSld>
+    <p:spTree>
+      <p:nvGrpSpPr>
+        <p:cNvPr id="1" name=""/>
+        <p:cNvGrpSpPr/>
+        <p:nvPr/>
+      </p:nvGrpSpPr>
+      <p:grpSpPr>
+        <a:xfrm>
+          <a:off x="0" y="0"/>
+          <a:ext cx="0" cy="0"/>
+          <a:chOff x="0" y="0"/>
+          <a:chExt cx="0" cy="0"/>
+        </a:xfrm>
+      </p:grpSpPr>
+      <p:sp>
+        <p:nvSpPr>
+          <p:cNvPr id="2" name="Title 1"/>
+          <p:cNvSpPr>
+            <a:spLocks noGrp="1"/>
+          </p:cNvSpPr>
+          <p:nvPr>
+            <p:ph type="title"/>
+          </p:nvPr>
+        </p:nvSpPr>
+        <p:spPr/>
+        <p:txBody>
+          <a:bodyPr/>
+          <a:lstStyle/>
+          <a:p>
+            <a:r>
+              <a:rPr lang="en-US" dirty="0" err="1" smtClean="0"/>
+              <a:t>Matplotlib</a:t>
+            </a:r>
+            <a:r>
+              <a:rPr lang="en-US" dirty="0" smtClean="0"/>
+              <a:t> Gallery</a:t>
+            </a:r>
+            <a:endParaRPr lang="en-US" dirty="0"/>
+          </a:p>
+        </p:txBody>
+      </p:sp>
+      <p:sp>
+        <p:nvSpPr>
+          <p:cNvPr id="3" name="Content Placeholder 2"/>
+          <p:cNvSpPr>
+            <a:spLocks noGrp="1"/>
+          </p:cNvSpPr>
+          <p:nvPr>
+            <p:ph idx="1"/>
+          </p:nvPr>
+        </p:nvSpPr>
+        <p:spPr>
+          <a:xfrm>
+            <a:off x="838200" y="2986087"/>
+            <a:ext cx="10515600" cy="1143001"/>
+          </a:xfrm>
+        </p:spPr>
+        <p:txBody>
+          <a:bodyPr>
+            <a:normAutofit/>
+          </a:bodyPr>
+          <a:lstStyle/>
+          <a:p>
+            <a:pPr marL="0" lvl="0" indent="0">
+              <a:lnSpc>
+                <a:spcPct val="100000"/>
+              </a:lnSpc>
+              <a:spcBef>
+                <a:spcPts val="0"/>
+              </a:spcBef>
+              <a:buNone/>
+            </a:pPr>
+            <a:r>
+              <a:rPr lang="en-US" sz="4200" dirty="0" smtClean="0"/>
+              <a:t>http://</a:t>
+            </a:r>
+            <a:r>
+              <a:rPr lang="en-US" sz="4200" dirty="0" err="1" smtClean="0"/>
+              <a:t>matplotlib.org</a:t>
+            </a:r>
+            <a:r>
+              <a:rPr lang="en-US" sz="4200" dirty="0" smtClean="0"/>
+              <a:t>/examples/</a:t>
+            </a:r>
+            <a:r>
+              <a:rPr lang="en-US" sz="4200" dirty="0" err="1" smtClean="0"/>
+              <a:t>index.html</a:t>
+            </a:r>
+            <a:endParaRPr lang="en-US" sz="4200" dirty="0"/>
+          </a:p>
+        </p:txBody>
+      </p:sp>
+    </p:spTree>
+    <p:extLst>
+      <p:ext uri="{BB962C8B-B14F-4D97-AF65-F5344CB8AC3E}">
+        <p14:creationId xmlns:p14="http://schemas.microsoft.com/office/powerpoint/2010/main" val="945871665"/>
+      </p:ext>
+    </p:extLst>
+  </p:cSld>
+  <p:clrMapOvr>
+    <a:masterClrMapping/>
+  </p:clrMapOvr>
+  <p:timing>
+    <p:tnLst>
+      <p:par>
+        <p:cTn id="1" dur="indefinite" restart="never" nodeType="tmRoot"/>
+      </p:par>
+    </p:tnLst>
+  </p:timing>
+</p:sld>
+</file>
+
+<file path=ppt/slides/slide17.xml><?xml version="1.0" encoding="utf-8"?>
+<p:sld xmlns:a="http://schemas.openxmlformats.org/drawingml/2006/main" xmlns:r="http://schemas.openxmlformats.org/officeDocument/2006/relationships" xmlns:p="http://schemas.openxmlformats.org/presentationml/2006/main">
+  <p:cSld>
+    <p:spTree>
+      <p:nvGrpSpPr>
+        <p:cNvPr id="1" name=""/>
+        <p:cNvGrpSpPr/>
+        <p:nvPr/>
+      </p:nvGrpSpPr>
+      <p:grpSpPr>
+        <a:xfrm>
+          <a:off x="0" y="0"/>
+          <a:ext cx="0" cy="0"/>
+          <a:chOff x="0" y="0"/>
+          <a:chExt cx="0" cy="0"/>
+        </a:xfrm>
+      </p:grpSpPr>
+      <p:sp>
+        <p:nvSpPr>
+          <p:cNvPr id="2" name="Title 1"/>
+          <p:cNvSpPr>
+            <a:spLocks noGrp="1"/>
+          </p:cNvSpPr>
+          <p:nvPr>
+            <p:ph type="title"/>
+          </p:nvPr>
+        </p:nvSpPr>
+        <p:spPr/>
+        <p:txBody>
+          <a:bodyPr/>
+          <a:lstStyle/>
+          <a:p>
+            <a:r>
+              <a:rPr lang="en-US" dirty="0" smtClean="0"/>
+              <a:t>Agenda</a:t>
+            </a:r>
+            <a:endParaRPr lang="en-US" dirty="0"/>
+          </a:p>
+        </p:txBody>
+      </p:sp>
+      <p:sp>
+        <p:nvSpPr>
+          <p:cNvPr id="3" name="Content Placeholder 2"/>
+          <p:cNvSpPr>
+            <a:spLocks noGrp="1"/>
+          </p:cNvSpPr>
+          <p:nvPr>
+            <p:ph idx="1"/>
+          </p:nvPr>
+        </p:nvSpPr>
+        <p:spPr/>
+        <p:txBody>
+          <a:bodyPr/>
+          <a:lstStyle/>
+          <a:p>
+            <a:r>
+              <a:rPr lang="en-US" dirty="0" smtClean="0"/>
+              <a:t>Databases</a:t>
+            </a:r>
+          </a:p>
+          <a:p>
+            <a:r>
+              <a:rPr lang="en-US" dirty="0" smtClean="0"/>
+              <a:t>Midterm</a:t>
+            </a:r>
+          </a:p>
+          <a:p>
+            <a:r>
               <a:rPr lang="en-US" dirty="0" err="1" smtClean="0"/>
               <a:t>Matplotlib</a:t>
             </a:r>
@@ -3239,7 +3937,7 @@
 </p:sld>
 </file>
 
-<file path=ppt/slides/slide12.xml><?xml version="1.0" encoding="utf-8"?>
+<file path=ppt/slides/slide18.xml><?xml version="1.0" encoding="utf-8"?>
 <p:sld xmlns:a="http://schemas.openxmlformats.org/drawingml/2006/main" xmlns:r="http://schemas.openxmlformats.org/officeDocument/2006/relationships" xmlns:p="http://schemas.openxmlformats.org/presentationml/2006/main">
   <p:cSld>
     <p:spTree>
@@ -3306,7 +4004,7 @@
 </p:sld>
 </file>
 
-<file path=ppt/slides/slide13.xml><?xml version="1.0" encoding="utf-8"?>
+<file path=ppt/slides/slide19.xml><?xml version="1.0" encoding="utf-8"?>
 <p:sld xmlns:a="http://schemas.openxmlformats.org/drawingml/2006/main" xmlns:r="http://schemas.openxmlformats.org/officeDocument/2006/relationships" xmlns:p="http://schemas.openxmlformats.org/presentationml/2006/main">
   <p:cSld>
     <p:spTree>
@@ -3483,6 +4181,12 @@
           </a:p>
           <a:p>
             <a:r>
+              <a:rPr lang="en-US" dirty="0" smtClean="0"/>
+              <a:t>Midterm</a:t>
+            </a:r>
+          </a:p>
+          <a:p>
+            <a:r>
               <a:rPr lang="en-US" dirty="0" err="1" smtClean="0"/>
               <a:t>Matplotlib</a:t>
             </a:r>
@@ -3518,78 +4222,6 @@
 </file>
 
 <file path=ppt/slides/slide3.xml><?xml version="1.0" encoding="utf-8"?>
-<p:sld xmlns:a="http://schemas.openxmlformats.org/drawingml/2006/main" xmlns:r="http://schemas.openxmlformats.org/officeDocument/2006/relationships" xmlns:p="http://schemas.openxmlformats.org/presentationml/2006/main">
-  <p:cSld>
-    <p:spTree>
-      <p:nvGrpSpPr>
-        <p:cNvPr id="1" name=""/>
-        <p:cNvGrpSpPr/>
-        <p:nvPr/>
-      </p:nvGrpSpPr>
-      <p:grpSpPr>
-        <a:xfrm>
-          <a:off x="0" y="0"/>
-          <a:ext cx="0" cy="0"/>
-          <a:chOff x="0" y="0"/>
-          <a:chExt cx="0" cy="0"/>
-        </a:xfrm>
-      </p:grpSpPr>
-      <p:sp>
-        <p:nvSpPr>
-          <p:cNvPr id="2" name="Title 1"/>
-          <p:cNvSpPr>
-            <a:spLocks noGrp="1"/>
-          </p:cNvSpPr>
-          <p:nvPr>
-            <p:ph type="title"/>
-          </p:nvPr>
-        </p:nvSpPr>
-        <p:spPr/>
-        <p:txBody>
-          <a:bodyPr/>
-          <a:lstStyle/>
-          <a:p>
-            <a:r>
-              <a:rPr lang="en-US" dirty="0" smtClean="0"/>
-              <a:t>Databases</a:t>
-            </a:r>
-            <a:endParaRPr lang="en-US" dirty="0"/>
-          </a:p>
-        </p:txBody>
-      </p:sp>
-      <p:sp>
-        <p:nvSpPr>
-          <p:cNvPr id="3" name="Text Placeholder 2"/>
-          <p:cNvSpPr>
-            <a:spLocks noGrp="1"/>
-          </p:cNvSpPr>
-          <p:nvPr>
-            <p:ph type="body" idx="1"/>
-          </p:nvPr>
-        </p:nvSpPr>
-        <p:spPr/>
-        <p:txBody>
-          <a:bodyPr/>
-          <a:lstStyle/>
-          <a:p>
-            <a:endParaRPr lang="en-US"/>
-          </a:p>
-        </p:txBody>
-      </p:sp>
-    </p:spTree>
-    <p:extLst>
-      <p:ext uri="{BB962C8B-B14F-4D97-AF65-F5344CB8AC3E}">
-        <p14:creationId xmlns:p14="http://schemas.microsoft.com/office/powerpoint/2010/main" val="1699188652"/>
-      </p:ext>
-    </p:extLst>
-  </p:cSld>
-  <p:clrMapOvr>
-    <a:masterClrMapping/>
-  </p:clrMapOvr>
-</p:sld>
-</file>
-
-<file path=ppt/slides/slide4.xml><?xml version="1.0" encoding="utf-8"?>
 <p:sld xmlns:a="http://schemas.openxmlformats.org/drawingml/2006/main" xmlns:r="http://schemas.openxmlformats.org/officeDocument/2006/relationships" xmlns:p="http://schemas.openxmlformats.org/presentationml/2006/main">
   <p:cSld>
     <p:spTree>
@@ -4020,7 +4652,7 @@
 </p:sld>
 </file>
 
-<file path=ppt/slides/slide5.xml><?xml version="1.0" encoding="utf-8"?>
+<file path=ppt/slides/slide4.xml><?xml version="1.0" encoding="utf-8"?>
 <p:sld xmlns:a="http://schemas.openxmlformats.org/drawingml/2006/main" xmlns:r="http://schemas.openxmlformats.org/officeDocument/2006/relationships" xmlns:p="http://schemas.openxmlformats.org/presentationml/2006/main">
   <p:cSld>
     <p:spTree>
@@ -4792,6 +5424,657 @@
 </p:sld>
 </file>
 
+<file path=ppt/slides/slide5.xml><?xml version="1.0" encoding="utf-8"?>
+<p:sld xmlns:a="http://schemas.openxmlformats.org/drawingml/2006/main" xmlns:r="http://schemas.openxmlformats.org/officeDocument/2006/relationships" xmlns:p="http://schemas.openxmlformats.org/presentationml/2006/main">
+  <p:cSld>
+    <p:spTree>
+      <p:nvGrpSpPr>
+        <p:cNvPr id="1" name=""/>
+        <p:cNvGrpSpPr/>
+        <p:nvPr/>
+      </p:nvGrpSpPr>
+      <p:grpSpPr>
+        <a:xfrm>
+          <a:off x="0" y="0"/>
+          <a:ext cx="0" cy="0"/>
+          <a:chOff x="0" y="0"/>
+          <a:chExt cx="0" cy="0"/>
+        </a:xfrm>
+      </p:grpSpPr>
+      <p:sp>
+        <p:nvSpPr>
+          <p:cNvPr id="2" name="Title 1"/>
+          <p:cNvSpPr>
+            <a:spLocks noGrp="1"/>
+          </p:cNvSpPr>
+          <p:nvPr>
+            <p:ph type="title"/>
+          </p:nvPr>
+        </p:nvSpPr>
+        <p:spPr/>
+        <p:txBody>
+          <a:bodyPr/>
+          <a:lstStyle/>
+          <a:p>
+            <a:r>
+              <a:rPr lang="en-US" dirty="0" smtClean="0"/>
+              <a:t>Inserting data to a database</a:t>
+            </a:r>
+            <a:endParaRPr lang="en-US" dirty="0"/>
+          </a:p>
+        </p:txBody>
+      </p:sp>
+      <p:sp>
+        <p:nvSpPr>
+          <p:cNvPr id="4" name="Content Placeholder 2"/>
+          <p:cNvSpPr txBox="1">
+            <a:spLocks/>
+          </p:cNvSpPr>
+          <p:nvPr/>
+        </p:nvSpPr>
+        <p:spPr>
+          <a:xfrm>
+            <a:off x="836362" y="1690688"/>
+            <a:ext cx="10515600" cy="1850835"/>
+          </a:xfrm>
+          <a:prstGeom prst="rect">
+            <a:avLst/>
+          </a:prstGeom>
+        </p:spPr>
+        <p:txBody>
+          <a:bodyPr vert="horz" lIns="91440" tIns="45720" rIns="91440" bIns="45720" rtlCol="0">
+            <a:normAutofit/>
+          </a:bodyPr>
+          <a:lstStyle>
+            <a:lvl1pPr marL="228600" indent="-228600" algn="l" defTabSz="914400" rtl="0" eaLnBrk="1" latinLnBrk="0" hangingPunct="1">
+              <a:lnSpc>
+                <a:spcPct val="90000"/>
+              </a:lnSpc>
+              <a:spcBef>
+                <a:spcPts val="1000"/>
+              </a:spcBef>
+              <a:buFont typeface="Arial"/>
+              <a:buChar char="•"/>
+              <a:defRPr sz="2800" kern="1200">
+                <a:solidFill>
+                  <a:schemeClr val="tx1"/>
+                </a:solidFill>
+                <a:latin typeface="+mn-lt"/>
+                <a:ea typeface="+mn-ea"/>
+                <a:cs typeface="+mn-cs"/>
+              </a:defRPr>
+            </a:lvl1pPr>
+            <a:lvl2pPr marL="685800" indent="-228600" algn="l" defTabSz="914400" rtl="0" eaLnBrk="1" latinLnBrk="0" hangingPunct="1">
+              <a:lnSpc>
+                <a:spcPct val="90000"/>
+              </a:lnSpc>
+              <a:spcBef>
+                <a:spcPts val="500"/>
+              </a:spcBef>
+              <a:buFont typeface="Arial"/>
+              <a:buChar char="•"/>
+              <a:defRPr sz="2400" kern="1200">
+                <a:solidFill>
+                  <a:schemeClr val="tx1"/>
+                </a:solidFill>
+                <a:latin typeface="+mn-lt"/>
+                <a:ea typeface="+mn-ea"/>
+                <a:cs typeface="+mn-cs"/>
+              </a:defRPr>
+            </a:lvl2pPr>
+            <a:lvl3pPr marL="1143000" indent="-228600" algn="l" defTabSz="914400" rtl="0" eaLnBrk="1" latinLnBrk="0" hangingPunct="1">
+              <a:lnSpc>
+                <a:spcPct val="90000"/>
+              </a:lnSpc>
+              <a:spcBef>
+                <a:spcPts val="500"/>
+              </a:spcBef>
+              <a:buFont typeface="Arial"/>
+              <a:buChar char="•"/>
+              <a:defRPr sz="2000" kern="1200">
+                <a:solidFill>
+                  <a:schemeClr val="tx1"/>
+                </a:solidFill>
+                <a:latin typeface="+mn-lt"/>
+                <a:ea typeface="+mn-ea"/>
+                <a:cs typeface="+mn-cs"/>
+              </a:defRPr>
+            </a:lvl3pPr>
+            <a:lvl4pPr marL="1600200" indent="-228600" algn="l" defTabSz="914400" rtl="0" eaLnBrk="1" latinLnBrk="0" hangingPunct="1">
+              <a:lnSpc>
+                <a:spcPct val="90000"/>
+              </a:lnSpc>
+              <a:spcBef>
+                <a:spcPts val="500"/>
+              </a:spcBef>
+              <a:buFont typeface="Arial"/>
+              <a:buChar char="•"/>
+              <a:defRPr sz="1800" kern="1200">
+                <a:solidFill>
+                  <a:schemeClr val="tx1"/>
+                </a:solidFill>
+                <a:latin typeface="+mn-lt"/>
+                <a:ea typeface="+mn-ea"/>
+                <a:cs typeface="+mn-cs"/>
+              </a:defRPr>
+            </a:lvl4pPr>
+            <a:lvl5pPr marL="2057400" indent="-228600" algn="l" defTabSz="914400" rtl="0" eaLnBrk="1" latinLnBrk="0" hangingPunct="1">
+              <a:lnSpc>
+                <a:spcPct val="90000"/>
+              </a:lnSpc>
+              <a:spcBef>
+                <a:spcPts val="500"/>
+              </a:spcBef>
+              <a:buFont typeface="Arial"/>
+              <a:buChar char="•"/>
+              <a:defRPr sz="1800" kern="1200">
+                <a:solidFill>
+                  <a:schemeClr val="tx1"/>
+                </a:solidFill>
+                <a:latin typeface="+mn-lt"/>
+                <a:ea typeface="+mn-ea"/>
+                <a:cs typeface="+mn-cs"/>
+              </a:defRPr>
+            </a:lvl5pPr>
+            <a:lvl6pPr marL="2514600" indent="-228600" algn="l" defTabSz="914400" rtl="0" eaLnBrk="1" latinLnBrk="0" hangingPunct="1">
+              <a:lnSpc>
+                <a:spcPct val="90000"/>
+              </a:lnSpc>
+              <a:spcBef>
+                <a:spcPts val="500"/>
+              </a:spcBef>
+              <a:buFont typeface="Arial"/>
+              <a:buChar char="•"/>
+              <a:defRPr sz="1800" kern="1200">
+                <a:solidFill>
+                  <a:schemeClr val="tx1"/>
+                </a:solidFill>
+                <a:latin typeface="+mn-lt"/>
+                <a:ea typeface="+mn-ea"/>
+                <a:cs typeface="+mn-cs"/>
+              </a:defRPr>
+            </a:lvl6pPr>
+            <a:lvl7pPr marL="2971800" indent="-228600" algn="l" defTabSz="914400" rtl="0" eaLnBrk="1" latinLnBrk="0" hangingPunct="1">
+              <a:lnSpc>
+                <a:spcPct val="90000"/>
+              </a:lnSpc>
+              <a:spcBef>
+                <a:spcPts val="500"/>
+              </a:spcBef>
+              <a:buFont typeface="Arial"/>
+              <a:buChar char="•"/>
+              <a:defRPr sz="1800" kern="1200">
+                <a:solidFill>
+                  <a:schemeClr val="tx1"/>
+                </a:solidFill>
+                <a:latin typeface="+mn-lt"/>
+                <a:ea typeface="+mn-ea"/>
+                <a:cs typeface="+mn-cs"/>
+              </a:defRPr>
+            </a:lvl7pPr>
+            <a:lvl8pPr marL="3429000" indent="-228600" algn="l" defTabSz="914400" rtl="0" eaLnBrk="1" latinLnBrk="0" hangingPunct="1">
+              <a:lnSpc>
+                <a:spcPct val="90000"/>
+              </a:lnSpc>
+              <a:spcBef>
+                <a:spcPts val="500"/>
+              </a:spcBef>
+              <a:buFont typeface="Arial"/>
+              <a:buChar char="•"/>
+              <a:defRPr sz="1800" kern="1200">
+                <a:solidFill>
+                  <a:schemeClr val="tx1"/>
+                </a:solidFill>
+                <a:latin typeface="+mn-lt"/>
+                <a:ea typeface="+mn-ea"/>
+                <a:cs typeface="+mn-cs"/>
+              </a:defRPr>
+            </a:lvl8pPr>
+            <a:lvl9pPr marL="3886200" indent="-228600" algn="l" defTabSz="914400" rtl="0" eaLnBrk="1" latinLnBrk="0" hangingPunct="1">
+              <a:lnSpc>
+                <a:spcPct val="90000"/>
+              </a:lnSpc>
+              <a:spcBef>
+                <a:spcPts val="500"/>
+              </a:spcBef>
+              <a:buFont typeface="Arial"/>
+              <a:buChar char="•"/>
+              <a:defRPr sz="1800" kern="1200">
+                <a:solidFill>
+                  <a:schemeClr val="tx1"/>
+                </a:solidFill>
+                <a:latin typeface="+mn-lt"/>
+                <a:ea typeface="+mn-ea"/>
+                <a:cs typeface="+mn-cs"/>
+              </a:defRPr>
+            </a:lvl9pPr>
+          </a:lstStyle>
+          <a:p>
+            <a:pPr marL="0" indent="0">
+              <a:buNone/>
+            </a:pPr>
+            <a:r>
+              <a:rPr lang="en-US" dirty="0" smtClean="0">
+                <a:latin typeface="Courier New" charset="0"/>
+                <a:ea typeface="Courier New" charset="0"/>
+                <a:cs typeface="Courier New" charset="0"/>
+              </a:rPr>
+              <a:t>data = [('Atlanta', 'Georgia', 1.25, 6), ('Tallahassee', 'Florida', 2.6, 3), ('Sacramento', 'California', 1.7, 5)] </a:t>
+            </a:r>
+          </a:p>
+        </p:txBody>
+      </p:sp>
+      <p:sp>
+        <p:nvSpPr>
+          <p:cNvPr id="5" name="Content Placeholder 2"/>
+          <p:cNvSpPr txBox="1">
+            <a:spLocks/>
+          </p:cNvSpPr>
+          <p:nvPr/>
+        </p:nvSpPr>
+        <p:spPr>
+          <a:xfrm>
+            <a:off x="836362" y="3016251"/>
+            <a:ext cx="10515600" cy="2421109"/>
+          </a:xfrm>
+          <a:prstGeom prst="rect">
+            <a:avLst/>
+          </a:prstGeom>
+        </p:spPr>
+        <p:txBody>
+          <a:bodyPr vert="horz" lIns="91440" tIns="45720" rIns="91440" bIns="45720" rtlCol="0">
+            <a:normAutofit/>
+          </a:bodyPr>
+          <a:lstStyle>
+            <a:lvl1pPr marL="228600" indent="-228600" algn="l" defTabSz="914400" rtl="0" eaLnBrk="1" latinLnBrk="0" hangingPunct="1">
+              <a:lnSpc>
+                <a:spcPct val="90000"/>
+              </a:lnSpc>
+              <a:spcBef>
+                <a:spcPts val="1000"/>
+              </a:spcBef>
+              <a:buFont typeface="Arial"/>
+              <a:buChar char="•"/>
+              <a:defRPr sz="2800" kern="1200">
+                <a:solidFill>
+                  <a:schemeClr val="tx1"/>
+                </a:solidFill>
+                <a:latin typeface="+mn-lt"/>
+                <a:ea typeface="+mn-ea"/>
+                <a:cs typeface="+mn-cs"/>
+              </a:defRPr>
+            </a:lvl1pPr>
+            <a:lvl2pPr marL="685800" indent="-228600" algn="l" defTabSz="914400" rtl="0" eaLnBrk="1" latinLnBrk="0" hangingPunct="1">
+              <a:lnSpc>
+                <a:spcPct val="90000"/>
+              </a:lnSpc>
+              <a:spcBef>
+                <a:spcPts val="500"/>
+              </a:spcBef>
+              <a:buFont typeface="Arial"/>
+              <a:buChar char="•"/>
+              <a:defRPr sz="2400" kern="1200">
+                <a:solidFill>
+                  <a:schemeClr val="tx1"/>
+                </a:solidFill>
+                <a:latin typeface="+mn-lt"/>
+                <a:ea typeface="+mn-ea"/>
+                <a:cs typeface="+mn-cs"/>
+              </a:defRPr>
+            </a:lvl2pPr>
+            <a:lvl3pPr marL="1143000" indent="-228600" algn="l" defTabSz="914400" rtl="0" eaLnBrk="1" latinLnBrk="0" hangingPunct="1">
+              <a:lnSpc>
+                <a:spcPct val="90000"/>
+              </a:lnSpc>
+              <a:spcBef>
+                <a:spcPts val="500"/>
+              </a:spcBef>
+              <a:buFont typeface="Arial"/>
+              <a:buChar char="•"/>
+              <a:defRPr sz="2000" kern="1200">
+                <a:solidFill>
+                  <a:schemeClr val="tx1"/>
+                </a:solidFill>
+                <a:latin typeface="+mn-lt"/>
+                <a:ea typeface="+mn-ea"/>
+                <a:cs typeface="+mn-cs"/>
+              </a:defRPr>
+            </a:lvl3pPr>
+            <a:lvl4pPr marL="1600200" indent="-228600" algn="l" defTabSz="914400" rtl="0" eaLnBrk="1" latinLnBrk="0" hangingPunct="1">
+              <a:lnSpc>
+                <a:spcPct val="90000"/>
+              </a:lnSpc>
+              <a:spcBef>
+                <a:spcPts val="500"/>
+              </a:spcBef>
+              <a:buFont typeface="Arial"/>
+              <a:buChar char="•"/>
+              <a:defRPr sz="1800" kern="1200">
+                <a:solidFill>
+                  <a:schemeClr val="tx1"/>
+                </a:solidFill>
+                <a:latin typeface="+mn-lt"/>
+                <a:ea typeface="+mn-ea"/>
+                <a:cs typeface="+mn-cs"/>
+              </a:defRPr>
+            </a:lvl4pPr>
+            <a:lvl5pPr marL="2057400" indent="-228600" algn="l" defTabSz="914400" rtl="0" eaLnBrk="1" latinLnBrk="0" hangingPunct="1">
+              <a:lnSpc>
+                <a:spcPct val="90000"/>
+              </a:lnSpc>
+              <a:spcBef>
+                <a:spcPts val="500"/>
+              </a:spcBef>
+              <a:buFont typeface="Arial"/>
+              <a:buChar char="•"/>
+              <a:defRPr sz="1800" kern="1200">
+                <a:solidFill>
+                  <a:schemeClr val="tx1"/>
+                </a:solidFill>
+                <a:latin typeface="+mn-lt"/>
+                <a:ea typeface="+mn-ea"/>
+                <a:cs typeface="+mn-cs"/>
+              </a:defRPr>
+            </a:lvl5pPr>
+            <a:lvl6pPr marL="2514600" indent="-228600" algn="l" defTabSz="914400" rtl="0" eaLnBrk="1" latinLnBrk="0" hangingPunct="1">
+              <a:lnSpc>
+                <a:spcPct val="90000"/>
+              </a:lnSpc>
+              <a:spcBef>
+                <a:spcPts val="500"/>
+              </a:spcBef>
+              <a:buFont typeface="Arial"/>
+              <a:buChar char="•"/>
+              <a:defRPr sz="1800" kern="1200">
+                <a:solidFill>
+                  <a:schemeClr val="tx1"/>
+                </a:solidFill>
+                <a:latin typeface="+mn-lt"/>
+                <a:ea typeface="+mn-ea"/>
+                <a:cs typeface="+mn-cs"/>
+              </a:defRPr>
+            </a:lvl6pPr>
+            <a:lvl7pPr marL="2971800" indent="-228600" algn="l" defTabSz="914400" rtl="0" eaLnBrk="1" latinLnBrk="0" hangingPunct="1">
+              <a:lnSpc>
+                <a:spcPct val="90000"/>
+              </a:lnSpc>
+              <a:spcBef>
+                <a:spcPts val="500"/>
+              </a:spcBef>
+              <a:buFont typeface="Arial"/>
+              <a:buChar char="•"/>
+              <a:defRPr sz="1800" kern="1200">
+                <a:solidFill>
+                  <a:schemeClr val="tx1"/>
+                </a:solidFill>
+                <a:latin typeface="+mn-lt"/>
+                <a:ea typeface="+mn-ea"/>
+                <a:cs typeface="+mn-cs"/>
+              </a:defRPr>
+            </a:lvl7pPr>
+            <a:lvl8pPr marL="3429000" indent="-228600" algn="l" defTabSz="914400" rtl="0" eaLnBrk="1" latinLnBrk="0" hangingPunct="1">
+              <a:lnSpc>
+                <a:spcPct val="90000"/>
+              </a:lnSpc>
+              <a:spcBef>
+                <a:spcPts val="500"/>
+              </a:spcBef>
+              <a:buFont typeface="Arial"/>
+              <a:buChar char="•"/>
+              <a:defRPr sz="1800" kern="1200">
+                <a:solidFill>
+                  <a:schemeClr val="tx1"/>
+                </a:solidFill>
+                <a:latin typeface="+mn-lt"/>
+                <a:ea typeface="+mn-ea"/>
+                <a:cs typeface="+mn-cs"/>
+              </a:defRPr>
+            </a:lvl8pPr>
+            <a:lvl9pPr marL="3886200" indent="-228600" algn="l" defTabSz="914400" rtl="0" eaLnBrk="1" latinLnBrk="0" hangingPunct="1">
+              <a:lnSpc>
+                <a:spcPct val="90000"/>
+              </a:lnSpc>
+              <a:spcBef>
+                <a:spcPts val="500"/>
+              </a:spcBef>
+              <a:buFont typeface="Arial"/>
+              <a:buChar char="•"/>
+              <a:defRPr sz="1800" kern="1200">
+                <a:solidFill>
+                  <a:schemeClr val="tx1"/>
+                </a:solidFill>
+                <a:latin typeface="+mn-lt"/>
+                <a:ea typeface="+mn-ea"/>
+                <a:cs typeface="+mn-cs"/>
+              </a:defRPr>
+            </a:lvl9pPr>
+          </a:lstStyle>
+          <a:p>
+            <a:pPr marL="0" indent="0">
+              <a:buNone/>
+            </a:pPr>
+            <a:r>
+              <a:rPr lang="en-US" dirty="0" err="1" smtClean="0">
+                <a:latin typeface="Courier New" charset="0"/>
+                <a:ea typeface="Courier New" charset="0"/>
+                <a:cs typeface="Courier New" charset="0"/>
+              </a:rPr>
+              <a:t>stmt</a:t>
+            </a:r>
+            <a:r>
+              <a:rPr lang="en-US" dirty="0" smtClean="0">
+                <a:latin typeface="Courier New" charset="0"/>
+                <a:ea typeface="Courier New" charset="0"/>
+                <a:cs typeface="Courier New" charset="0"/>
+              </a:rPr>
+              <a:t> = "INSERT INTO test VALUES(?, ?, ?, ?)" </a:t>
+            </a:r>
+          </a:p>
+          <a:p>
+            <a:pPr marL="0" indent="0">
+              <a:buNone/>
+            </a:pPr>
+            <a:r>
+              <a:rPr lang="en-US" dirty="0" err="1" smtClean="0">
+                <a:latin typeface="Courier New" charset="0"/>
+                <a:ea typeface="Courier New" charset="0"/>
+                <a:cs typeface="Courier New" charset="0"/>
+              </a:rPr>
+              <a:t>con.executemany</a:t>
+            </a:r>
+            <a:r>
+              <a:rPr lang="en-US" dirty="0" smtClean="0">
+                <a:latin typeface="Courier New" charset="0"/>
+                <a:ea typeface="Courier New" charset="0"/>
+                <a:cs typeface="Courier New" charset="0"/>
+              </a:rPr>
+              <a:t>(</a:t>
+            </a:r>
+            <a:r>
+              <a:rPr lang="en-US" dirty="0" err="1" smtClean="0">
+                <a:latin typeface="Courier New" charset="0"/>
+                <a:ea typeface="Courier New" charset="0"/>
+                <a:cs typeface="Courier New" charset="0"/>
+              </a:rPr>
+              <a:t>stmt</a:t>
+            </a:r>
+            <a:r>
+              <a:rPr lang="en-US" dirty="0" smtClean="0">
+                <a:latin typeface="Courier New" charset="0"/>
+                <a:ea typeface="Courier New" charset="0"/>
+                <a:cs typeface="Courier New" charset="0"/>
+              </a:rPr>
+              <a:t>, data) </a:t>
+            </a:r>
+            <a:r>
+              <a:rPr lang="en-US" dirty="0" err="1" smtClean="0">
+                <a:latin typeface="Courier New" charset="0"/>
+                <a:ea typeface="Courier New" charset="0"/>
+                <a:cs typeface="Courier New" charset="0"/>
+              </a:rPr>
+              <a:t>con.commit</a:t>
+            </a:r>
+            <a:r>
+              <a:rPr lang="en-US" dirty="0" smtClean="0">
+                <a:latin typeface="Courier New" charset="0"/>
+                <a:ea typeface="Courier New" charset="0"/>
+                <a:cs typeface="Courier New" charset="0"/>
+              </a:rPr>
+              <a:t>() </a:t>
+            </a:r>
+          </a:p>
+          <a:p>
+            <a:pPr marL="0" indent="0">
+              <a:lnSpc>
+                <a:spcPct val="100000"/>
+              </a:lnSpc>
+              <a:spcBef>
+                <a:spcPts val="0"/>
+              </a:spcBef>
+              <a:buFontTx/>
+              <a:buNone/>
+            </a:pPr>
+            <a:endParaRPr lang="en-US" dirty="0"/>
+          </a:p>
+        </p:txBody>
+      </p:sp>
+    </p:spTree>
+    <p:extLst>
+      <p:ext uri="{BB962C8B-B14F-4D97-AF65-F5344CB8AC3E}">
+        <p14:creationId xmlns:p14="http://schemas.microsoft.com/office/powerpoint/2010/main" val="1853841959"/>
+      </p:ext>
+    </p:extLst>
+  </p:cSld>
+  <p:clrMapOvr>
+    <a:masterClrMapping/>
+  </p:clrMapOvr>
+  <p:timing>
+    <p:tnLst>
+      <p:par>
+        <p:cTn id="1" dur="indefinite" restart="never" nodeType="tmRoot">
+          <p:childTnLst>
+            <p:seq concurrent="1" nextAc="seek">
+              <p:cTn id="2" dur="indefinite" nodeType="mainSeq">
+                <p:childTnLst>
+                  <p:par>
+                    <p:cTn id="3" fill="hold">
+                      <p:stCondLst>
+                        <p:cond delay="indefinite"/>
+                      </p:stCondLst>
+                      <p:childTnLst>
+                        <p:par>
+                          <p:cTn id="4" fill="hold">
+                            <p:stCondLst>
+                              <p:cond delay="0"/>
+                            </p:stCondLst>
+                            <p:childTnLst>
+                              <p:par>
+                                <p:cTn id="5" presetID="1" presetClass="entr" presetSubtype="0" fill="hold" grpId="0" nodeType="clickEffect">
+                                  <p:stCondLst>
+                                    <p:cond delay="0"/>
+                                  </p:stCondLst>
+                                  <p:childTnLst>
+                                    <p:set>
+                                      <p:cBhvr>
+                                        <p:cTn id="6" dur="1" fill="hold">
+                                          <p:stCondLst>
+                                            <p:cond delay="0"/>
+                                          </p:stCondLst>
+                                        </p:cTn>
+                                        <p:tgtEl>
+                                          <p:spTgt spid="4"/>
+                                        </p:tgtEl>
+                                        <p:attrNameLst>
+                                          <p:attrName>style.visibility</p:attrName>
+                                        </p:attrNameLst>
+                                      </p:cBhvr>
+                                      <p:to>
+                                        <p:strVal val="visible"/>
+                                      </p:to>
+                                    </p:set>
+                                  </p:childTnLst>
+                                </p:cTn>
+                              </p:par>
+                            </p:childTnLst>
+                          </p:cTn>
+                        </p:par>
+                      </p:childTnLst>
+                    </p:cTn>
+                  </p:par>
+                  <p:par>
+                    <p:cTn id="7" fill="hold">
+                      <p:stCondLst>
+                        <p:cond delay="indefinite"/>
+                      </p:stCondLst>
+                      <p:childTnLst>
+                        <p:par>
+                          <p:cTn id="8" fill="hold">
+                            <p:stCondLst>
+                              <p:cond delay="0"/>
+                            </p:stCondLst>
+                            <p:childTnLst>
+                              <p:par>
+                                <p:cTn id="9" presetID="1" presetClass="entr" presetSubtype="0" fill="hold" grpId="0" nodeType="clickEffect">
+                                  <p:stCondLst>
+                                    <p:cond delay="0"/>
+                                  </p:stCondLst>
+                                  <p:childTnLst>
+                                    <p:set>
+                                      <p:cBhvr>
+                                        <p:cTn id="10" dur="1" fill="hold">
+                                          <p:stCondLst>
+                                            <p:cond delay="0"/>
+                                          </p:stCondLst>
+                                        </p:cTn>
+                                        <p:tgtEl>
+                                          <p:spTgt spid="5"/>
+                                        </p:tgtEl>
+                                        <p:attrNameLst>
+                                          <p:attrName>style.visibility</p:attrName>
+                                        </p:attrNameLst>
+                                      </p:cBhvr>
+                                      <p:to>
+                                        <p:strVal val="visible"/>
+                                      </p:to>
+                                    </p:set>
+                                  </p:childTnLst>
+                                </p:cTn>
+                              </p:par>
+                            </p:childTnLst>
+                          </p:cTn>
+                        </p:par>
+                      </p:childTnLst>
+                    </p:cTn>
+                  </p:par>
+                </p:childTnLst>
+              </p:cTn>
+              <p:prevCondLst>
+                <p:cond evt="onPrev" delay="0">
+                  <p:tgtEl>
+                    <p:sldTgt/>
+                  </p:tgtEl>
+                </p:cond>
+              </p:prevCondLst>
+              <p:nextCondLst>
+                <p:cond evt="onNext" delay="0">
+                  <p:tgtEl>
+                    <p:sldTgt/>
+                  </p:tgtEl>
+                </p:cond>
+              </p:nextCondLst>
+            </p:seq>
+          </p:childTnLst>
+        </p:cTn>
+      </p:par>
+    </p:tnLst>
+    <p:bldLst>
+      <p:bldP spid="4" grpId="0"/>
+      <p:bldP spid="5" grpId="0"/>
+    </p:bldLst>
+  </p:timing>
+</p:sld>
+</file>
+
 <file path=ppt/slides/slide6.xml><?xml version="1.0" encoding="utf-8"?>
 <p:sld xmlns:a="http://schemas.openxmlformats.org/drawingml/2006/main" xmlns:r="http://schemas.openxmlformats.org/officeDocument/2006/relationships" xmlns:p="http://schemas.openxmlformats.org/presentationml/2006/main">
   <p:cSld>
@@ -4826,7 +6109,7 @@
           <a:p>
             <a:r>
               <a:rPr lang="en-US" dirty="0" smtClean="0"/>
-              <a:t>Inserting data to a database</a:t>
+              <a:t>Finding data in a database</a:t>
             </a:r>
             <a:endParaRPr lang="en-US" dirty="0"/>
           </a:p>
@@ -4843,7 +6126,7 @@
         <p:spPr>
           <a:xfrm>
             <a:off x="836362" y="1690688"/>
-            <a:ext cx="10515600" cy="1850835"/>
+            <a:ext cx="10515600" cy="638175"/>
           </a:xfrm>
           <a:prstGeom prst="rect">
             <a:avLst/>
@@ -5027,7 +6310,23 @@
                 <a:ea typeface="Courier New" charset="0"/>
                 <a:cs typeface="Courier New" charset="0"/>
               </a:rPr>
-              <a:t>data = [('Atlanta', 'Georgia', 1.25, 6), ('Tallahassee', 'Florida', 2.6, 3), ('Sacramento', 'California', 1.7, 5)] </a:t>
+              <a:t>cursor = </a:t>
+            </a:r>
+            <a:r>
+              <a:rPr lang="en-US" dirty="0" err="1" smtClean="0">
+                <a:latin typeface="Courier New" charset="0"/>
+                <a:ea typeface="Courier New" charset="0"/>
+                <a:cs typeface="Courier New" charset="0"/>
+              </a:rPr>
+              <a:t>con.execute</a:t>
+            </a:r>
+            <a:r>
+              <a:rPr lang="en-US" dirty="0" smtClean="0">
+                <a:latin typeface="Courier New" charset="0"/>
+                <a:ea typeface="Courier New" charset="0"/>
+                <a:cs typeface="Courier New" charset="0"/>
+              </a:rPr>
+              <a:t>('select * from test') </a:t>
             </a:r>
           </a:p>
         </p:txBody>
@@ -5042,8 +6341,8 @@
         </p:nvSpPr>
         <p:spPr>
           <a:xfrm>
-            <a:off x="836362" y="3016251"/>
-            <a:ext cx="10515600" cy="2421109"/>
+            <a:off x="836362" y="2316164"/>
+            <a:ext cx="10515600" cy="3398836"/>
           </a:xfrm>
           <a:prstGeom prst="rect">
             <a:avLst/>
@@ -5222,12 +6521,20 @@
               <a:buNone/>
             </a:pPr>
             <a:r>
+              <a:rPr lang="en-US" dirty="0" smtClean="0">
+                <a:latin typeface="Courier New" charset="0"/>
+                <a:ea typeface="Courier New" charset="0"/>
+                <a:cs typeface="Courier New" charset="0"/>
+              </a:rPr>
+              <a:t>rows = </a:t>
+            </a:r>
+            <a:r>
               <a:rPr lang="en-US" dirty="0" err="1" smtClean="0">
                 <a:latin typeface="Courier New" charset="0"/>
                 <a:ea typeface="Courier New" charset="0"/>
                 <a:cs typeface="Courier New" charset="0"/>
               </a:rPr>
-              <a:t>stmt</a:t>
+              <a:t>cursor.fetchall</a:t>
             </a:r>
             <a:r>
               <a:rPr lang="en-US" dirty="0" smtClean="0">
@@ -5235,60 +6542,122 @@
                 <a:ea typeface="Courier New" charset="0"/>
                 <a:cs typeface="Courier New" charset="0"/>
               </a:rPr>
-              <a:t> = "INSERT INTO test VALUES(?, ?, ?, ?)" </a:t>
+              <a:t>()</a:t>
             </a:r>
           </a:p>
           <a:p>
             <a:pPr marL="0" indent="0">
               <a:buNone/>
             </a:pPr>
-            <a:r>
-              <a:rPr lang="en-US" dirty="0" err="1" smtClean="0">
-                <a:latin typeface="Courier New" charset="0"/>
-                <a:ea typeface="Courier New" charset="0"/>
-                <a:cs typeface="Courier New" charset="0"/>
-              </a:rPr>
-              <a:t>con.executemany</a:t>
-            </a:r>
             <a:r>
               <a:rPr lang="en-US" dirty="0" smtClean="0">
                 <a:latin typeface="Courier New" charset="0"/>
                 <a:ea typeface="Courier New" charset="0"/>
                 <a:cs typeface="Courier New" charset="0"/>
               </a:rPr>
+              <a:t> </a:t>
+            </a:r>
+          </a:p>
+          <a:p>
+            <a:pPr marL="0" indent="0">
+              <a:lnSpc>
+                <a:spcPct val="100000"/>
+              </a:lnSpc>
+              <a:spcBef>
+                <a:spcPts val="0"/>
+              </a:spcBef>
+              <a:buFontTx/>
+              <a:buNone/>
+            </a:pPr>
+            <a:r>
+              <a:rPr lang="nl-NL" dirty="0" smtClean="0"/>
+              <a:t>In [580]: </a:t>
+            </a:r>
+            <a:r>
+              <a:rPr lang="nl-NL" dirty="0" err="1" smtClean="0"/>
+              <a:t>rows</a:t>
+            </a:r>
+            <a:r>
+              <a:rPr lang="nl-NL" dirty="0" smtClean="0"/>
+              <a:t/>
+            </a:r>
+            <a:br>
+              <a:rPr lang="nl-NL" dirty="0" smtClean="0"/>
+            </a:br>
+            <a:r>
+              <a:rPr lang="nl-NL" dirty="0" smtClean="0"/>
+              <a:t>Out[580]:</a:t>
+            </a:r>
+            <a:br>
+              <a:rPr lang="nl-NL" dirty="0" smtClean="0"/>
+            </a:br>
+            <a:r>
+              <a:rPr lang="nl-NL" dirty="0" smtClean="0"/>
+              <a:t>[(</a:t>
+            </a:r>
+            <a:r>
+              <a:rPr lang="nl-NL" dirty="0" err="1" smtClean="0"/>
+              <a:t>u'Atlanta</a:t>
+            </a:r>
+            <a:r>
+              <a:rPr lang="nl-NL" dirty="0" smtClean="0"/>
+              <a:t>', </a:t>
+            </a:r>
+            <a:r>
+              <a:rPr lang="nl-NL" dirty="0" err="1" smtClean="0"/>
+              <a:t>u'Georgia</a:t>
+            </a:r>
+            <a:r>
+              <a:rPr lang="nl-NL" dirty="0" smtClean="0"/>
+              <a:t>', 1.25, 6), </a:t>
+            </a:r>
+          </a:p>
+          <a:p>
+            <a:pPr marL="0" indent="0">
+              <a:lnSpc>
+                <a:spcPct val="100000"/>
+              </a:lnSpc>
+              <a:spcBef>
+                <a:spcPts val="0"/>
+              </a:spcBef>
+              <a:buFontTx/>
+              <a:buNone/>
+            </a:pPr>
+            <a:r>
+              <a:rPr lang="nl-NL" dirty="0" smtClean="0"/>
               <a:t>(</a:t>
             </a:r>
             <a:r>
-              <a:rPr lang="en-US" dirty="0" err="1" smtClean="0">
-                <a:latin typeface="Courier New" charset="0"/>
-                <a:ea typeface="Courier New" charset="0"/>
-                <a:cs typeface="Courier New" charset="0"/>
-              </a:rPr>
-              <a:t>stmt</a:t>
-            </a:r>
-            <a:r>
-              <a:rPr lang="en-US" dirty="0" smtClean="0">
-                <a:latin typeface="Courier New" charset="0"/>
-                <a:ea typeface="Courier New" charset="0"/>
-                <a:cs typeface="Courier New" charset="0"/>
-              </a:rPr>
-              <a:t>, data) </a:t>
-            </a:r>
-            <a:r>
-              <a:rPr lang="en-US" dirty="0" err="1" smtClean="0">
-                <a:latin typeface="Courier New" charset="0"/>
-                <a:ea typeface="Courier New" charset="0"/>
-                <a:cs typeface="Courier New" charset="0"/>
-              </a:rPr>
-              <a:t>con.commit</a:t>
-            </a:r>
-            <a:r>
-              <a:rPr lang="en-US" dirty="0" smtClean="0">
-                <a:latin typeface="Courier New" charset="0"/>
-                <a:ea typeface="Courier New" charset="0"/>
-                <a:cs typeface="Courier New" charset="0"/>
-              </a:rPr>
-              <a:t>() </a:t>
+              <a:rPr lang="nl-NL" dirty="0" err="1" smtClean="0"/>
+              <a:t>u'Tallahassee</a:t>
+            </a:r>
+            <a:r>
+              <a:rPr lang="nl-NL" dirty="0" smtClean="0"/>
+              <a:t>', </a:t>
+            </a:r>
+            <a:r>
+              <a:rPr lang="nl-NL" dirty="0" err="1" smtClean="0"/>
+              <a:t>u'Florida</a:t>
+            </a:r>
+            <a:r>
+              <a:rPr lang="nl-NL" dirty="0" smtClean="0"/>
+              <a:t>', 2.6, 3), (</a:t>
+            </a:r>
+            <a:r>
+              <a:rPr lang="nl-NL" dirty="0" err="1" smtClean="0"/>
+              <a:t>u'Sacramento</a:t>
+            </a:r>
+            <a:r>
+              <a:rPr lang="nl-NL" dirty="0" smtClean="0"/>
+              <a:t>', </a:t>
+            </a:r>
+            <a:r>
+              <a:rPr lang="nl-NL" dirty="0" err="1" smtClean="0"/>
+              <a:t>u'California</a:t>
+            </a:r>
+            <a:r>
+              <a:rPr lang="nl-NL" dirty="0" smtClean="0"/>
+              <a:t>', 1.7, 5)] </a:t>
             </a:r>
           </a:p>
           <a:p>
@@ -5309,7 +6678,7 @@
     </p:spTree>
     <p:extLst>
       <p:ext uri="{BB962C8B-B14F-4D97-AF65-F5344CB8AC3E}">
-        <p14:creationId xmlns:p14="http://schemas.microsoft.com/office/powerpoint/2010/main" val="1853841959"/>
+        <p14:creationId xmlns:p14="http://schemas.microsoft.com/office/powerpoint/2010/main" val="2041552792"/>
       </p:ext>
     </p:extLst>
   </p:cSld>
@@ -5477,743 +6846,6 @@
           <a:p>
             <a:r>
               <a:rPr lang="en-US" dirty="0" smtClean="0"/>
-              <a:t>Finding data in a database</a:t>
-            </a:r>
-            <a:endParaRPr lang="en-US" dirty="0"/>
-          </a:p>
-        </p:txBody>
-      </p:sp>
-      <p:sp>
-        <p:nvSpPr>
-          <p:cNvPr id="4" name="Content Placeholder 2"/>
-          <p:cNvSpPr txBox="1">
-            <a:spLocks/>
-          </p:cNvSpPr>
-          <p:nvPr/>
-        </p:nvSpPr>
-        <p:spPr>
-          <a:xfrm>
-            <a:off x="836362" y="1690688"/>
-            <a:ext cx="10515600" cy="638175"/>
-          </a:xfrm>
-          <a:prstGeom prst="rect">
-            <a:avLst/>
-          </a:prstGeom>
-        </p:spPr>
-        <p:txBody>
-          <a:bodyPr vert="horz" lIns="91440" tIns="45720" rIns="91440" bIns="45720" rtlCol="0">
-            <a:normAutofit/>
-          </a:bodyPr>
-          <a:lstStyle>
-            <a:lvl1pPr marL="228600" indent="-228600" algn="l" defTabSz="914400" rtl="0" eaLnBrk="1" latinLnBrk="0" hangingPunct="1">
-              <a:lnSpc>
-                <a:spcPct val="90000"/>
-              </a:lnSpc>
-              <a:spcBef>
-                <a:spcPts val="1000"/>
-              </a:spcBef>
-              <a:buFont typeface="Arial"/>
-              <a:buChar char="•"/>
-              <a:defRPr sz="2800" kern="1200">
-                <a:solidFill>
-                  <a:schemeClr val="tx1"/>
-                </a:solidFill>
-                <a:latin typeface="+mn-lt"/>
-                <a:ea typeface="+mn-ea"/>
-                <a:cs typeface="+mn-cs"/>
-              </a:defRPr>
-            </a:lvl1pPr>
-            <a:lvl2pPr marL="685800" indent="-228600" algn="l" defTabSz="914400" rtl="0" eaLnBrk="1" latinLnBrk="0" hangingPunct="1">
-              <a:lnSpc>
-                <a:spcPct val="90000"/>
-              </a:lnSpc>
-              <a:spcBef>
-                <a:spcPts val="500"/>
-              </a:spcBef>
-              <a:buFont typeface="Arial"/>
-              <a:buChar char="•"/>
-              <a:defRPr sz="2400" kern="1200">
-                <a:solidFill>
-                  <a:schemeClr val="tx1"/>
-                </a:solidFill>
-                <a:latin typeface="+mn-lt"/>
-                <a:ea typeface="+mn-ea"/>
-                <a:cs typeface="+mn-cs"/>
-              </a:defRPr>
-            </a:lvl2pPr>
-            <a:lvl3pPr marL="1143000" indent="-228600" algn="l" defTabSz="914400" rtl="0" eaLnBrk="1" latinLnBrk="0" hangingPunct="1">
-              <a:lnSpc>
-                <a:spcPct val="90000"/>
-              </a:lnSpc>
-              <a:spcBef>
-                <a:spcPts val="500"/>
-              </a:spcBef>
-              <a:buFont typeface="Arial"/>
-              <a:buChar char="•"/>
-              <a:defRPr sz="2000" kern="1200">
-                <a:solidFill>
-                  <a:schemeClr val="tx1"/>
-                </a:solidFill>
-                <a:latin typeface="+mn-lt"/>
-                <a:ea typeface="+mn-ea"/>
-                <a:cs typeface="+mn-cs"/>
-              </a:defRPr>
-            </a:lvl3pPr>
-            <a:lvl4pPr marL="1600200" indent="-228600" algn="l" defTabSz="914400" rtl="0" eaLnBrk="1" latinLnBrk="0" hangingPunct="1">
-              <a:lnSpc>
-                <a:spcPct val="90000"/>
-              </a:lnSpc>
-              <a:spcBef>
-                <a:spcPts val="500"/>
-              </a:spcBef>
-              <a:buFont typeface="Arial"/>
-              <a:buChar char="•"/>
-              <a:defRPr sz="1800" kern="1200">
-                <a:solidFill>
-                  <a:schemeClr val="tx1"/>
-                </a:solidFill>
-                <a:latin typeface="+mn-lt"/>
-                <a:ea typeface="+mn-ea"/>
-                <a:cs typeface="+mn-cs"/>
-              </a:defRPr>
-            </a:lvl4pPr>
-            <a:lvl5pPr marL="2057400" indent="-228600" algn="l" defTabSz="914400" rtl="0" eaLnBrk="1" latinLnBrk="0" hangingPunct="1">
-              <a:lnSpc>
-                <a:spcPct val="90000"/>
-              </a:lnSpc>
-              <a:spcBef>
-                <a:spcPts val="500"/>
-              </a:spcBef>
-              <a:buFont typeface="Arial"/>
-              <a:buChar char="•"/>
-              <a:defRPr sz="1800" kern="1200">
-                <a:solidFill>
-                  <a:schemeClr val="tx1"/>
-                </a:solidFill>
-                <a:latin typeface="+mn-lt"/>
-                <a:ea typeface="+mn-ea"/>
-                <a:cs typeface="+mn-cs"/>
-              </a:defRPr>
-            </a:lvl5pPr>
-            <a:lvl6pPr marL="2514600" indent="-228600" algn="l" defTabSz="914400" rtl="0" eaLnBrk="1" latinLnBrk="0" hangingPunct="1">
-              <a:lnSpc>
-                <a:spcPct val="90000"/>
-              </a:lnSpc>
-              <a:spcBef>
-                <a:spcPts val="500"/>
-              </a:spcBef>
-              <a:buFont typeface="Arial"/>
-              <a:buChar char="•"/>
-              <a:defRPr sz="1800" kern="1200">
-                <a:solidFill>
-                  <a:schemeClr val="tx1"/>
-                </a:solidFill>
-                <a:latin typeface="+mn-lt"/>
-                <a:ea typeface="+mn-ea"/>
-                <a:cs typeface="+mn-cs"/>
-              </a:defRPr>
-            </a:lvl6pPr>
-            <a:lvl7pPr marL="2971800" indent="-228600" algn="l" defTabSz="914400" rtl="0" eaLnBrk="1" latinLnBrk="0" hangingPunct="1">
-              <a:lnSpc>
-                <a:spcPct val="90000"/>
-              </a:lnSpc>
-              <a:spcBef>
-                <a:spcPts val="500"/>
-              </a:spcBef>
-              <a:buFont typeface="Arial"/>
-              <a:buChar char="•"/>
-              <a:defRPr sz="1800" kern="1200">
-                <a:solidFill>
-                  <a:schemeClr val="tx1"/>
-                </a:solidFill>
-                <a:latin typeface="+mn-lt"/>
-                <a:ea typeface="+mn-ea"/>
-                <a:cs typeface="+mn-cs"/>
-              </a:defRPr>
-            </a:lvl7pPr>
-            <a:lvl8pPr marL="3429000" indent="-228600" algn="l" defTabSz="914400" rtl="0" eaLnBrk="1" latinLnBrk="0" hangingPunct="1">
-              <a:lnSpc>
-                <a:spcPct val="90000"/>
-              </a:lnSpc>
-              <a:spcBef>
-                <a:spcPts val="500"/>
-              </a:spcBef>
-              <a:buFont typeface="Arial"/>
-              <a:buChar char="•"/>
-              <a:defRPr sz="1800" kern="1200">
-                <a:solidFill>
-                  <a:schemeClr val="tx1"/>
-                </a:solidFill>
-                <a:latin typeface="+mn-lt"/>
-                <a:ea typeface="+mn-ea"/>
-                <a:cs typeface="+mn-cs"/>
-              </a:defRPr>
-            </a:lvl8pPr>
-            <a:lvl9pPr marL="3886200" indent="-228600" algn="l" defTabSz="914400" rtl="0" eaLnBrk="1" latinLnBrk="0" hangingPunct="1">
-              <a:lnSpc>
-                <a:spcPct val="90000"/>
-              </a:lnSpc>
-              <a:spcBef>
-                <a:spcPts val="500"/>
-              </a:spcBef>
-              <a:buFont typeface="Arial"/>
-              <a:buChar char="•"/>
-              <a:defRPr sz="1800" kern="1200">
-                <a:solidFill>
-                  <a:schemeClr val="tx1"/>
-                </a:solidFill>
-                <a:latin typeface="+mn-lt"/>
-                <a:ea typeface="+mn-ea"/>
-                <a:cs typeface="+mn-cs"/>
-              </a:defRPr>
-            </a:lvl9pPr>
-          </a:lstStyle>
-          <a:p>
-            <a:pPr marL="0" indent="0">
-              <a:buNone/>
-            </a:pPr>
-            <a:r>
-              <a:rPr lang="en-US" dirty="0" smtClean="0">
-                <a:latin typeface="Courier New" charset="0"/>
-                <a:ea typeface="Courier New" charset="0"/>
-                <a:cs typeface="Courier New" charset="0"/>
-              </a:rPr>
-              <a:t>cursor = </a:t>
-            </a:r>
-            <a:r>
-              <a:rPr lang="en-US" dirty="0" err="1" smtClean="0">
-                <a:latin typeface="Courier New" charset="0"/>
-                <a:ea typeface="Courier New" charset="0"/>
-                <a:cs typeface="Courier New" charset="0"/>
-              </a:rPr>
-              <a:t>con.execute</a:t>
-            </a:r>
-            <a:r>
-              <a:rPr lang="en-US" dirty="0" smtClean="0">
-                <a:latin typeface="Courier New" charset="0"/>
-                <a:ea typeface="Courier New" charset="0"/>
-                <a:cs typeface="Courier New" charset="0"/>
-              </a:rPr>
-              <a:t>('select * from test') </a:t>
-            </a:r>
-          </a:p>
-        </p:txBody>
-      </p:sp>
-      <p:sp>
-        <p:nvSpPr>
-          <p:cNvPr id="5" name="Content Placeholder 2"/>
-          <p:cNvSpPr txBox="1">
-            <a:spLocks/>
-          </p:cNvSpPr>
-          <p:nvPr/>
-        </p:nvSpPr>
-        <p:spPr>
-          <a:xfrm>
-            <a:off x="836362" y="2316164"/>
-            <a:ext cx="10515600" cy="3398836"/>
-          </a:xfrm>
-          <a:prstGeom prst="rect">
-            <a:avLst/>
-          </a:prstGeom>
-        </p:spPr>
-        <p:txBody>
-          <a:bodyPr vert="horz" lIns="91440" tIns="45720" rIns="91440" bIns="45720" rtlCol="0">
-            <a:normAutofit/>
-          </a:bodyPr>
-          <a:lstStyle>
-            <a:lvl1pPr marL="228600" indent="-228600" algn="l" defTabSz="914400" rtl="0" eaLnBrk="1" latinLnBrk="0" hangingPunct="1">
-              <a:lnSpc>
-                <a:spcPct val="90000"/>
-              </a:lnSpc>
-              <a:spcBef>
-                <a:spcPts val="1000"/>
-              </a:spcBef>
-              <a:buFont typeface="Arial"/>
-              <a:buChar char="•"/>
-              <a:defRPr sz="2800" kern="1200">
-                <a:solidFill>
-                  <a:schemeClr val="tx1"/>
-                </a:solidFill>
-                <a:latin typeface="+mn-lt"/>
-                <a:ea typeface="+mn-ea"/>
-                <a:cs typeface="+mn-cs"/>
-              </a:defRPr>
-            </a:lvl1pPr>
-            <a:lvl2pPr marL="685800" indent="-228600" algn="l" defTabSz="914400" rtl="0" eaLnBrk="1" latinLnBrk="0" hangingPunct="1">
-              <a:lnSpc>
-                <a:spcPct val="90000"/>
-              </a:lnSpc>
-              <a:spcBef>
-                <a:spcPts val="500"/>
-              </a:spcBef>
-              <a:buFont typeface="Arial"/>
-              <a:buChar char="•"/>
-              <a:defRPr sz="2400" kern="1200">
-                <a:solidFill>
-                  <a:schemeClr val="tx1"/>
-                </a:solidFill>
-                <a:latin typeface="+mn-lt"/>
-                <a:ea typeface="+mn-ea"/>
-                <a:cs typeface="+mn-cs"/>
-              </a:defRPr>
-            </a:lvl2pPr>
-            <a:lvl3pPr marL="1143000" indent="-228600" algn="l" defTabSz="914400" rtl="0" eaLnBrk="1" latinLnBrk="0" hangingPunct="1">
-              <a:lnSpc>
-                <a:spcPct val="90000"/>
-              </a:lnSpc>
-              <a:spcBef>
-                <a:spcPts val="500"/>
-              </a:spcBef>
-              <a:buFont typeface="Arial"/>
-              <a:buChar char="•"/>
-              <a:defRPr sz="2000" kern="1200">
-                <a:solidFill>
-                  <a:schemeClr val="tx1"/>
-                </a:solidFill>
-                <a:latin typeface="+mn-lt"/>
-                <a:ea typeface="+mn-ea"/>
-                <a:cs typeface="+mn-cs"/>
-              </a:defRPr>
-            </a:lvl3pPr>
-            <a:lvl4pPr marL="1600200" indent="-228600" algn="l" defTabSz="914400" rtl="0" eaLnBrk="1" latinLnBrk="0" hangingPunct="1">
-              <a:lnSpc>
-                <a:spcPct val="90000"/>
-              </a:lnSpc>
-              <a:spcBef>
-                <a:spcPts val="500"/>
-              </a:spcBef>
-              <a:buFont typeface="Arial"/>
-              <a:buChar char="•"/>
-              <a:defRPr sz="1800" kern="1200">
-                <a:solidFill>
-                  <a:schemeClr val="tx1"/>
-                </a:solidFill>
-                <a:latin typeface="+mn-lt"/>
-                <a:ea typeface="+mn-ea"/>
-                <a:cs typeface="+mn-cs"/>
-              </a:defRPr>
-            </a:lvl4pPr>
-            <a:lvl5pPr marL="2057400" indent="-228600" algn="l" defTabSz="914400" rtl="0" eaLnBrk="1" latinLnBrk="0" hangingPunct="1">
-              <a:lnSpc>
-                <a:spcPct val="90000"/>
-              </a:lnSpc>
-              <a:spcBef>
-                <a:spcPts val="500"/>
-              </a:spcBef>
-              <a:buFont typeface="Arial"/>
-              <a:buChar char="•"/>
-              <a:defRPr sz="1800" kern="1200">
-                <a:solidFill>
-                  <a:schemeClr val="tx1"/>
-                </a:solidFill>
-                <a:latin typeface="+mn-lt"/>
-                <a:ea typeface="+mn-ea"/>
-                <a:cs typeface="+mn-cs"/>
-              </a:defRPr>
-            </a:lvl5pPr>
-            <a:lvl6pPr marL="2514600" indent="-228600" algn="l" defTabSz="914400" rtl="0" eaLnBrk="1" latinLnBrk="0" hangingPunct="1">
-              <a:lnSpc>
-                <a:spcPct val="90000"/>
-              </a:lnSpc>
-              <a:spcBef>
-                <a:spcPts val="500"/>
-              </a:spcBef>
-              <a:buFont typeface="Arial"/>
-              <a:buChar char="•"/>
-              <a:defRPr sz="1800" kern="1200">
-                <a:solidFill>
-                  <a:schemeClr val="tx1"/>
-                </a:solidFill>
-                <a:latin typeface="+mn-lt"/>
-                <a:ea typeface="+mn-ea"/>
-                <a:cs typeface="+mn-cs"/>
-              </a:defRPr>
-            </a:lvl6pPr>
-            <a:lvl7pPr marL="2971800" indent="-228600" algn="l" defTabSz="914400" rtl="0" eaLnBrk="1" latinLnBrk="0" hangingPunct="1">
-              <a:lnSpc>
-                <a:spcPct val="90000"/>
-              </a:lnSpc>
-              <a:spcBef>
-                <a:spcPts val="500"/>
-              </a:spcBef>
-              <a:buFont typeface="Arial"/>
-              <a:buChar char="•"/>
-              <a:defRPr sz="1800" kern="1200">
-                <a:solidFill>
-                  <a:schemeClr val="tx1"/>
-                </a:solidFill>
-                <a:latin typeface="+mn-lt"/>
-                <a:ea typeface="+mn-ea"/>
-                <a:cs typeface="+mn-cs"/>
-              </a:defRPr>
-            </a:lvl7pPr>
-            <a:lvl8pPr marL="3429000" indent="-228600" algn="l" defTabSz="914400" rtl="0" eaLnBrk="1" latinLnBrk="0" hangingPunct="1">
-              <a:lnSpc>
-                <a:spcPct val="90000"/>
-              </a:lnSpc>
-              <a:spcBef>
-                <a:spcPts val="500"/>
-              </a:spcBef>
-              <a:buFont typeface="Arial"/>
-              <a:buChar char="•"/>
-              <a:defRPr sz="1800" kern="1200">
-                <a:solidFill>
-                  <a:schemeClr val="tx1"/>
-                </a:solidFill>
-                <a:latin typeface="+mn-lt"/>
-                <a:ea typeface="+mn-ea"/>
-                <a:cs typeface="+mn-cs"/>
-              </a:defRPr>
-            </a:lvl8pPr>
-            <a:lvl9pPr marL="3886200" indent="-228600" algn="l" defTabSz="914400" rtl="0" eaLnBrk="1" latinLnBrk="0" hangingPunct="1">
-              <a:lnSpc>
-                <a:spcPct val="90000"/>
-              </a:lnSpc>
-              <a:spcBef>
-                <a:spcPts val="500"/>
-              </a:spcBef>
-              <a:buFont typeface="Arial"/>
-              <a:buChar char="•"/>
-              <a:defRPr sz="1800" kern="1200">
-                <a:solidFill>
-                  <a:schemeClr val="tx1"/>
-                </a:solidFill>
-                <a:latin typeface="+mn-lt"/>
-                <a:ea typeface="+mn-ea"/>
-                <a:cs typeface="+mn-cs"/>
-              </a:defRPr>
-            </a:lvl9pPr>
-          </a:lstStyle>
-          <a:p>
-            <a:pPr marL="0" indent="0">
-              <a:buNone/>
-            </a:pPr>
-            <a:r>
-              <a:rPr lang="en-US" dirty="0" smtClean="0">
-                <a:latin typeface="Courier New" charset="0"/>
-                <a:ea typeface="Courier New" charset="0"/>
-                <a:cs typeface="Courier New" charset="0"/>
-              </a:rPr>
-              <a:t>rows = </a:t>
-            </a:r>
-            <a:r>
-              <a:rPr lang="en-US" dirty="0" err="1" smtClean="0">
-                <a:latin typeface="Courier New" charset="0"/>
-                <a:ea typeface="Courier New" charset="0"/>
-                <a:cs typeface="Courier New" charset="0"/>
-              </a:rPr>
-              <a:t>cursor.fetchall</a:t>
-            </a:r>
-            <a:r>
-              <a:rPr lang="en-US" dirty="0" smtClean="0">
-                <a:latin typeface="Courier New" charset="0"/>
-                <a:ea typeface="Courier New" charset="0"/>
-                <a:cs typeface="Courier New" charset="0"/>
-              </a:rPr>
-              <a:t>()</a:t>
-            </a:r>
-          </a:p>
-          <a:p>
-            <a:pPr marL="0" indent="0">
-              <a:buNone/>
-            </a:pPr>
-            <a:r>
-              <a:rPr lang="en-US" dirty="0" smtClean="0">
-                <a:latin typeface="Courier New" charset="0"/>
-                <a:ea typeface="Courier New" charset="0"/>
-                <a:cs typeface="Courier New" charset="0"/>
-              </a:rPr>
-              <a:t> </a:t>
-            </a:r>
-          </a:p>
-          <a:p>
-            <a:pPr marL="0" indent="0">
-              <a:lnSpc>
-                <a:spcPct val="100000"/>
-              </a:lnSpc>
-              <a:spcBef>
-                <a:spcPts val="0"/>
-              </a:spcBef>
-              <a:buFontTx/>
-              <a:buNone/>
-            </a:pPr>
-            <a:r>
-              <a:rPr lang="nl-NL" dirty="0" smtClean="0"/>
-              <a:t>In [580]: </a:t>
-            </a:r>
-            <a:r>
-              <a:rPr lang="nl-NL" dirty="0" err="1" smtClean="0"/>
-              <a:t>rows</a:t>
-            </a:r>
-            <a:r>
-              <a:rPr lang="nl-NL" dirty="0" smtClean="0"/>
-              <a:t/>
-            </a:r>
-            <a:br>
-              <a:rPr lang="nl-NL" dirty="0" smtClean="0"/>
-            </a:br>
-            <a:r>
-              <a:rPr lang="nl-NL" dirty="0" smtClean="0"/>
-              <a:t>Out[580]:</a:t>
-            </a:r>
-            <a:br>
-              <a:rPr lang="nl-NL" dirty="0" smtClean="0"/>
-            </a:br>
-            <a:r>
-              <a:rPr lang="nl-NL" dirty="0" smtClean="0"/>
-              <a:t>[(</a:t>
-            </a:r>
-            <a:r>
-              <a:rPr lang="nl-NL" dirty="0" err="1" smtClean="0"/>
-              <a:t>u'Atlanta</a:t>
-            </a:r>
-            <a:r>
-              <a:rPr lang="nl-NL" dirty="0" smtClean="0"/>
-              <a:t>', </a:t>
-            </a:r>
-            <a:r>
-              <a:rPr lang="nl-NL" dirty="0" err="1" smtClean="0"/>
-              <a:t>u'Georgia</a:t>
-            </a:r>
-            <a:r>
-              <a:rPr lang="nl-NL" dirty="0" smtClean="0"/>
-              <a:t>', 1.25, 6), </a:t>
-            </a:r>
-          </a:p>
-          <a:p>
-            <a:pPr marL="0" indent="0">
-              <a:lnSpc>
-                <a:spcPct val="100000"/>
-              </a:lnSpc>
-              <a:spcBef>
-                <a:spcPts val="0"/>
-              </a:spcBef>
-              <a:buFontTx/>
-              <a:buNone/>
-            </a:pPr>
-            <a:r>
-              <a:rPr lang="nl-NL" dirty="0" smtClean="0"/>
-              <a:t>(</a:t>
-            </a:r>
-            <a:r>
-              <a:rPr lang="nl-NL" dirty="0" err="1" smtClean="0"/>
-              <a:t>u'Tallahassee</a:t>
-            </a:r>
-            <a:r>
-              <a:rPr lang="nl-NL" dirty="0" smtClean="0"/>
-              <a:t>', </a:t>
-            </a:r>
-            <a:r>
-              <a:rPr lang="nl-NL" dirty="0" err="1" smtClean="0"/>
-              <a:t>u'Florida</a:t>
-            </a:r>
-            <a:r>
-              <a:rPr lang="nl-NL" dirty="0" smtClean="0"/>
-              <a:t>', 2.6, 3), (</a:t>
-            </a:r>
-            <a:r>
-              <a:rPr lang="nl-NL" dirty="0" err="1" smtClean="0"/>
-              <a:t>u'Sacramento</a:t>
-            </a:r>
-            <a:r>
-              <a:rPr lang="nl-NL" dirty="0" smtClean="0"/>
-              <a:t>', </a:t>
-            </a:r>
-            <a:r>
-              <a:rPr lang="nl-NL" dirty="0" err="1" smtClean="0"/>
-              <a:t>u'California</a:t>
-            </a:r>
-            <a:r>
-              <a:rPr lang="nl-NL" dirty="0" smtClean="0"/>
-              <a:t>', 1.7, 5)] </a:t>
-            </a:r>
-          </a:p>
-          <a:p>
-            <a:pPr marL="0" indent="0">
-              <a:lnSpc>
-                <a:spcPct val="100000"/>
-              </a:lnSpc>
-              <a:spcBef>
-                <a:spcPts val="0"/>
-              </a:spcBef>
-              <a:buFontTx/>
-              <a:buNone/>
-            </a:pPr>
-            <a:endParaRPr lang="en-US" dirty="0"/>
-          </a:p>
-        </p:txBody>
-      </p:sp>
-    </p:spTree>
-    <p:extLst>
-      <p:ext uri="{BB962C8B-B14F-4D97-AF65-F5344CB8AC3E}">
-        <p14:creationId xmlns:p14="http://schemas.microsoft.com/office/powerpoint/2010/main" val="2041552792"/>
-      </p:ext>
-    </p:extLst>
-  </p:cSld>
-  <p:clrMapOvr>
-    <a:masterClrMapping/>
-  </p:clrMapOvr>
-  <p:timing>
-    <p:tnLst>
-      <p:par>
-        <p:cTn id="1" dur="indefinite" restart="never" nodeType="tmRoot">
-          <p:childTnLst>
-            <p:seq concurrent="1" nextAc="seek">
-              <p:cTn id="2" dur="indefinite" nodeType="mainSeq">
-                <p:childTnLst>
-                  <p:par>
-                    <p:cTn id="3" fill="hold">
-                      <p:stCondLst>
-                        <p:cond delay="indefinite"/>
-                      </p:stCondLst>
-                      <p:childTnLst>
-                        <p:par>
-                          <p:cTn id="4" fill="hold">
-                            <p:stCondLst>
-                              <p:cond delay="0"/>
-                            </p:stCondLst>
-                            <p:childTnLst>
-                              <p:par>
-                                <p:cTn id="5" presetID="1" presetClass="entr" presetSubtype="0" fill="hold" grpId="0" nodeType="clickEffect">
-                                  <p:stCondLst>
-                                    <p:cond delay="0"/>
-                                  </p:stCondLst>
-                                  <p:childTnLst>
-                                    <p:set>
-                                      <p:cBhvr>
-                                        <p:cTn id="6" dur="1" fill="hold">
-                                          <p:stCondLst>
-                                            <p:cond delay="0"/>
-                                          </p:stCondLst>
-                                        </p:cTn>
-                                        <p:tgtEl>
-                                          <p:spTgt spid="4"/>
-                                        </p:tgtEl>
-                                        <p:attrNameLst>
-                                          <p:attrName>style.visibility</p:attrName>
-                                        </p:attrNameLst>
-                                      </p:cBhvr>
-                                      <p:to>
-                                        <p:strVal val="visible"/>
-                                      </p:to>
-                                    </p:set>
-                                  </p:childTnLst>
-                                </p:cTn>
-                              </p:par>
-                            </p:childTnLst>
-                          </p:cTn>
-                        </p:par>
-                      </p:childTnLst>
-                    </p:cTn>
-                  </p:par>
-                  <p:par>
-                    <p:cTn id="7" fill="hold">
-                      <p:stCondLst>
-                        <p:cond delay="indefinite"/>
-                      </p:stCondLst>
-                      <p:childTnLst>
-                        <p:par>
-                          <p:cTn id="8" fill="hold">
-                            <p:stCondLst>
-                              <p:cond delay="0"/>
-                            </p:stCondLst>
-                            <p:childTnLst>
-                              <p:par>
-                                <p:cTn id="9" presetID="1" presetClass="entr" presetSubtype="0" fill="hold" grpId="0" nodeType="clickEffect">
-                                  <p:stCondLst>
-                                    <p:cond delay="0"/>
-                                  </p:stCondLst>
-                                  <p:childTnLst>
-                                    <p:set>
-                                      <p:cBhvr>
-                                        <p:cTn id="10" dur="1" fill="hold">
-                                          <p:stCondLst>
-                                            <p:cond delay="0"/>
-                                          </p:stCondLst>
-                                        </p:cTn>
-                                        <p:tgtEl>
-                                          <p:spTgt spid="5"/>
-                                        </p:tgtEl>
-                                        <p:attrNameLst>
-                                          <p:attrName>style.visibility</p:attrName>
-                                        </p:attrNameLst>
-                                      </p:cBhvr>
-                                      <p:to>
-                                        <p:strVal val="visible"/>
-                                      </p:to>
-                                    </p:set>
-                                  </p:childTnLst>
-                                </p:cTn>
-                              </p:par>
-                            </p:childTnLst>
-                          </p:cTn>
-                        </p:par>
-                      </p:childTnLst>
-                    </p:cTn>
-                  </p:par>
-                </p:childTnLst>
-              </p:cTn>
-              <p:prevCondLst>
-                <p:cond evt="onPrev" delay="0">
-                  <p:tgtEl>
-                    <p:sldTgt/>
-                  </p:tgtEl>
-                </p:cond>
-              </p:prevCondLst>
-              <p:nextCondLst>
-                <p:cond evt="onNext" delay="0">
-                  <p:tgtEl>
-                    <p:sldTgt/>
-                  </p:tgtEl>
-                </p:cond>
-              </p:nextCondLst>
-            </p:seq>
-          </p:childTnLst>
-        </p:cTn>
-      </p:par>
-    </p:tnLst>
-    <p:bldLst>
-      <p:bldP spid="4" grpId="0"/>
-      <p:bldP spid="5" grpId="0"/>
-    </p:bldLst>
-  </p:timing>
-</p:sld>
-</file>
-
-<file path=ppt/slides/slide8.xml><?xml version="1.0" encoding="utf-8"?>
-<p:sld xmlns:a="http://schemas.openxmlformats.org/drawingml/2006/main" xmlns:r="http://schemas.openxmlformats.org/officeDocument/2006/relationships" xmlns:p="http://schemas.openxmlformats.org/presentationml/2006/main">
-  <p:cSld>
-    <p:spTree>
-      <p:nvGrpSpPr>
-        <p:cNvPr id="1" name=""/>
-        <p:cNvGrpSpPr/>
-        <p:nvPr/>
-      </p:nvGrpSpPr>
-      <p:grpSpPr>
-        <a:xfrm>
-          <a:off x="0" y="0"/>
-          <a:ext cx="0" cy="0"/>
-          <a:chOff x="0" y="0"/>
-          <a:chExt cx="0" cy="0"/>
-        </a:xfrm>
-      </p:grpSpPr>
-      <p:sp>
-        <p:nvSpPr>
-          <p:cNvPr id="2" name="Title 1"/>
-          <p:cNvSpPr>
-            <a:spLocks noGrp="1"/>
-          </p:cNvSpPr>
-          <p:nvPr>
-            <p:ph type="title"/>
-          </p:nvPr>
-        </p:nvSpPr>
-        <p:spPr/>
-        <p:txBody>
-          <a:bodyPr/>
-          <a:lstStyle/>
-          <a:p>
-            <a:r>
-              <a:rPr lang="en-US" dirty="0" smtClean="0"/>
               <a:t>Creating a </a:t>
             </a:r>
             <a:r>
@@ -6907,7 +7539,7 @@
 </p:sld>
 </file>
 
-<file path=ppt/slides/slide9.xml><?xml version="1.0" encoding="utf-8"?>
+<file path=ppt/slides/slide8.xml><?xml version="1.0" encoding="utf-8"?>
 <p:sld xmlns:a="http://schemas.openxmlformats.org/drawingml/2006/main" xmlns:r="http://schemas.openxmlformats.org/officeDocument/2006/relationships" xmlns:p="http://schemas.openxmlformats.org/presentationml/2006/main">
   <p:cSld>
     <p:spTree>
@@ -7343,6 +7975,108 @@
     <p:bldLst>
       <p:bldP spid="4" grpId="0"/>
     </p:bldLst>
+  </p:timing>
+</p:sld>
+</file>
+
+<file path=ppt/slides/slide9.xml><?xml version="1.0" encoding="utf-8"?>
+<p:sld xmlns:a="http://schemas.openxmlformats.org/drawingml/2006/main" xmlns:r="http://schemas.openxmlformats.org/officeDocument/2006/relationships" xmlns:p="http://schemas.openxmlformats.org/presentationml/2006/main">
+  <p:cSld>
+    <p:spTree>
+      <p:nvGrpSpPr>
+        <p:cNvPr id="1" name=""/>
+        <p:cNvGrpSpPr/>
+        <p:nvPr/>
+      </p:nvGrpSpPr>
+      <p:grpSpPr>
+        <a:xfrm>
+          <a:off x="0" y="0"/>
+          <a:ext cx="0" cy="0"/>
+          <a:chOff x="0" y="0"/>
+          <a:chExt cx="0" cy="0"/>
+        </a:xfrm>
+      </p:grpSpPr>
+      <p:sp>
+        <p:nvSpPr>
+          <p:cNvPr id="2" name="Title 1"/>
+          <p:cNvSpPr>
+            <a:spLocks noGrp="1"/>
+          </p:cNvSpPr>
+          <p:nvPr>
+            <p:ph type="title"/>
+          </p:nvPr>
+        </p:nvSpPr>
+        <p:spPr/>
+        <p:txBody>
+          <a:bodyPr/>
+          <a:lstStyle/>
+          <a:p>
+            <a:r>
+              <a:rPr lang="en-US" dirty="0" smtClean="0"/>
+              <a:t>Agenda</a:t>
+            </a:r>
+            <a:endParaRPr lang="en-US" dirty="0"/>
+          </a:p>
+        </p:txBody>
+      </p:sp>
+      <p:sp>
+        <p:nvSpPr>
+          <p:cNvPr id="3" name="Content Placeholder 2"/>
+          <p:cNvSpPr>
+            <a:spLocks noGrp="1"/>
+          </p:cNvSpPr>
+          <p:nvPr>
+            <p:ph idx="1"/>
+          </p:nvPr>
+        </p:nvSpPr>
+        <p:spPr/>
+        <p:txBody>
+          <a:bodyPr/>
+          <a:lstStyle/>
+          <a:p>
+            <a:r>
+              <a:rPr lang="en-US" dirty="0" smtClean="0"/>
+              <a:t>Databases</a:t>
+            </a:r>
+          </a:p>
+          <a:p>
+            <a:r>
+              <a:rPr lang="en-US" b="1" dirty="0" smtClean="0"/>
+              <a:t>Midterm</a:t>
+            </a:r>
+          </a:p>
+          <a:p>
+            <a:r>
+              <a:rPr lang="en-US" dirty="0" err="1" smtClean="0"/>
+              <a:t>Matplotlib</a:t>
+            </a:r>
+            <a:endParaRPr lang="en-US" dirty="0" smtClean="0"/>
+          </a:p>
+          <a:p>
+            <a:r>
+              <a:rPr lang="en-US" dirty="0" smtClean="0"/>
+              <a:t>Tableau</a:t>
+            </a:r>
+            <a:endParaRPr lang="en-US" dirty="0"/>
+          </a:p>
+        </p:txBody>
+      </p:sp>
+    </p:spTree>
+    <p:extLst>
+      <p:ext uri="{BB962C8B-B14F-4D97-AF65-F5344CB8AC3E}">
+        <p14:creationId xmlns:p14="http://schemas.microsoft.com/office/powerpoint/2010/main" val="914395436"/>
+      </p:ext>
+    </p:extLst>
+  </p:cSld>
+  <p:clrMapOvr>
+    <a:masterClrMapping/>
+  </p:clrMapOvr>
+  <p:timing>
+    <p:tnLst>
+      <p:par>
+        <p:cTn id="1" dur="indefinite" restart="never" nodeType="tmRoot"/>
+      </p:par>
+    </p:tnLst>
   </p:timing>
 </p:sld>
 </file>

</xml_diff>